<commit_message>
Finish the report and presentation (Closes #13)
</commit_message>
<xml_diff>
--- a/doc/Praesentation.pptx
+++ b/doc/Praesentation.pptx
@@ -5,10 +5,10 @@
     <p:sldMasterId id="2147483713" r:id="rId1"/>
   </p:sldMasterIdLst>
   <p:notesMasterIdLst>
-    <p:notesMasterId r:id="rId16"/>
+    <p:notesMasterId r:id="rId15"/>
   </p:notesMasterIdLst>
   <p:handoutMasterIdLst>
-    <p:handoutMasterId r:id="rId17"/>
+    <p:handoutMasterId r:id="rId16"/>
   </p:handoutMasterIdLst>
   <p:sldIdLst>
     <p:sldId id="256" r:id="rId2"/>
@@ -16,15 +16,14 @@
     <p:sldId id="258" r:id="rId4"/>
     <p:sldId id="259" r:id="rId5"/>
     <p:sldId id="263" r:id="rId6"/>
-    <p:sldId id="264" r:id="rId7"/>
-    <p:sldId id="266" r:id="rId8"/>
-    <p:sldId id="262" r:id="rId9"/>
-    <p:sldId id="267" r:id="rId10"/>
-    <p:sldId id="268" r:id="rId11"/>
-    <p:sldId id="270" r:id="rId12"/>
-    <p:sldId id="261" r:id="rId13"/>
-    <p:sldId id="269" r:id="rId14"/>
-    <p:sldId id="260" r:id="rId15"/>
+    <p:sldId id="266" r:id="rId7"/>
+    <p:sldId id="262" r:id="rId8"/>
+    <p:sldId id="267" r:id="rId9"/>
+    <p:sldId id="268" r:id="rId10"/>
+    <p:sldId id="270" r:id="rId11"/>
+    <p:sldId id="261" r:id="rId12"/>
+    <p:sldId id="269" r:id="rId13"/>
+    <p:sldId id="260" r:id="rId14"/>
   </p:sldIdLst>
   <p:sldSz cx="10693400" cy="7561263"/>
   <p:notesSz cx="6858000" cy="9144000"/>
@@ -1224,78 +1223,6 @@
         </a:p>
       </dgm:t>
     </dgm:pt>
-    <dgm:pt modelId="{4D275DDA-1B3F-4CF4-A2B6-6B56DCF77E5F}">
-      <dgm:prSet/>
-      <dgm:spPr/>
-      <dgm:t>
-        <a:bodyPr/>
-        <a:lstStyle/>
-        <a:p>
-          <a:r>
-            <a:rPr lang="de-CH" dirty="0"/>
-            <a:t>jOOQ JDBC DSL</a:t>
-          </a:r>
-        </a:p>
-      </dgm:t>
-    </dgm:pt>
-    <dgm:pt modelId="{EA711F69-C256-44B4-B7A9-D1CB39DB6CFA}" type="parTrans" cxnId="{F60609EE-CE22-437A-8896-A62FF9018ECA}">
-      <dgm:prSet/>
-      <dgm:spPr/>
-      <dgm:t>
-        <a:bodyPr/>
-        <a:lstStyle/>
-        <a:p>
-          <a:endParaRPr lang="de-CH"/>
-        </a:p>
-      </dgm:t>
-    </dgm:pt>
-    <dgm:pt modelId="{9993045D-67DF-44A2-B95D-F65F418E09B0}" type="sibTrans" cxnId="{F60609EE-CE22-437A-8896-A62FF9018ECA}">
-      <dgm:prSet/>
-      <dgm:spPr/>
-      <dgm:t>
-        <a:bodyPr/>
-        <a:lstStyle/>
-        <a:p>
-          <a:endParaRPr lang="de-CH"/>
-        </a:p>
-      </dgm:t>
-    </dgm:pt>
-    <dgm:pt modelId="{DA4C9581-E5B5-42F6-B806-165CE680C5BC}">
-      <dgm:prSet phldrT="[Text]"/>
-      <dgm:spPr/>
-      <dgm:t>
-        <a:bodyPr/>
-        <a:lstStyle/>
-        <a:p>
-          <a:r>
-            <a:rPr lang="de-CH" dirty="0"/>
-            <a:t>Integrierter Swagger-Client</a:t>
-          </a:r>
-        </a:p>
-      </dgm:t>
-    </dgm:pt>
-    <dgm:pt modelId="{2E46E8CE-735C-431C-B635-CAEBDFDDE692}" type="parTrans" cxnId="{944D4A49-F355-4A7A-B69E-CDF3BF5C4EC9}">
-      <dgm:prSet/>
-      <dgm:spPr/>
-      <dgm:t>
-        <a:bodyPr/>
-        <a:lstStyle/>
-        <a:p>
-          <a:endParaRPr lang="de-CH"/>
-        </a:p>
-      </dgm:t>
-    </dgm:pt>
-    <dgm:pt modelId="{DC5E37B1-3BBF-4DA0-9775-9402839009D9}" type="sibTrans" cxnId="{944D4A49-F355-4A7A-B69E-CDF3BF5C4EC9}">
-      <dgm:prSet/>
-      <dgm:spPr/>
-      <dgm:t>
-        <a:bodyPr/>
-        <a:lstStyle/>
-        <a:p>
-          <a:endParaRPr lang="de-CH"/>
-        </a:p>
-      </dgm:t>
-    </dgm:pt>
     <dgm:pt modelId="{F32EEE3E-FC17-47BE-8268-D952E5A474FB}">
       <dgm:prSet/>
       <dgm:spPr/>
@@ -1305,13 +1232,13 @@
         <a:p>
           <a:r>
             <a:rPr lang="de-CH" dirty="0"/>
-            <a:t>Mapping DTO </a:t>
+            <a:t>MapStruct (Mapping DTO </a:t>
           </a:r>
           <a:r>
             <a:rPr lang="de-CH" dirty="0">
               <a:sym typeface="Wingdings" panose="05000000000000000000" pitchFamily="2" charset="2"/>
             </a:rPr>
-            <a:t> Entity mit MapStruct</a:t>
+            <a:t> Entity)</a:t>
           </a:r>
           <a:endParaRPr lang="de-CH" dirty="0"/>
         </a:p>
@@ -1329,6 +1256,78 @@
       </dgm:t>
     </dgm:pt>
     <dgm:pt modelId="{0E9A4B41-1F14-46EC-9A29-2F189BB6A509}" type="sibTrans" cxnId="{FE632249-5348-46F4-96B2-6CC3CB4C4B51}">
+      <dgm:prSet/>
+      <dgm:spPr/>
+      <dgm:t>
+        <a:bodyPr/>
+        <a:lstStyle/>
+        <a:p>
+          <a:endParaRPr lang="de-CH"/>
+        </a:p>
+      </dgm:t>
+    </dgm:pt>
+    <dgm:pt modelId="{766ED039-BEA2-4440-9C22-6D0C2A62CCB3}">
+      <dgm:prSet/>
+      <dgm:spPr/>
+      <dgm:t>
+        <a:bodyPr/>
+        <a:lstStyle/>
+        <a:p>
+          <a:r>
+            <a:rPr lang="de-CH" dirty="0"/>
+            <a:t>jOOQ JDBC</a:t>
+          </a:r>
+        </a:p>
+      </dgm:t>
+    </dgm:pt>
+    <dgm:pt modelId="{2448C8FC-96FC-44EE-927D-2425D5DA3BFB}" type="parTrans" cxnId="{2845C2F0-839B-427C-A695-030DAE821BF6}">
+      <dgm:prSet/>
+      <dgm:spPr/>
+      <dgm:t>
+        <a:bodyPr/>
+        <a:lstStyle/>
+        <a:p>
+          <a:endParaRPr lang="de-CH"/>
+        </a:p>
+      </dgm:t>
+    </dgm:pt>
+    <dgm:pt modelId="{50E9031D-D8FB-4323-979E-11907E1A487C}" type="sibTrans" cxnId="{2845C2F0-839B-427C-A695-030DAE821BF6}">
+      <dgm:prSet/>
+      <dgm:spPr/>
+      <dgm:t>
+        <a:bodyPr/>
+        <a:lstStyle/>
+        <a:p>
+          <a:endParaRPr lang="de-CH"/>
+        </a:p>
+      </dgm:t>
+    </dgm:pt>
+    <dgm:pt modelId="{BFE2B4A8-3A82-43C8-AEFE-DAE1DFD0F29F}">
+      <dgm:prSet phldrT="[Text]"/>
+      <dgm:spPr/>
+      <dgm:t>
+        <a:bodyPr/>
+        <a:lstStyle/>
+        <a:p>
+          <a:r>
+            <a:rPr lang="de-CH" dirty="0"/>
+            <a:t>Integrierter Swagger-Client</a:t>
+          </a:r>
+        </a:p>
+      </dgm:t>
+    </dgm:pt>
+    <dgm:pt modelId="{EB927EE1-127C-4C7A-9212-2872CF1424EE}" type="parTrans" cxnId="{17E0D81F-61DA-41D6-9294-18BBA8DA1B1F}">
+      <dgm:prSet/>
+      <dgm:spPr/>
+      <dgm:t>
+        <a:bodyPr/>
+        <a:lstStyle/>
+        <a:p>
+          <a:endParaRPr lang="de-CH"/>
+        </a:p>
+      </dgm:t>
+    </dgm:pt>
+    <dgm:pt modelId="{9D2A1A1A-F5C2-4751-8768-C4C0295B2371}" type="sibTrans" cxnId="{17E0D81F-61DA-41D6-9294-18BBA8DA1B1F}">
       <dgm:prSet/>
       <dgm:spPr/>
       <dgm:t>
@@ -1448,27 +1447,27 @@
   <dgm:cxnLst>
     <dgm:cxn modelId="{F3FC7A0B-72F8-486B-9A45-9669BA0CAA74}" type="presOf" srcId="{4035D379-A683-4B1C-9920-2FB65D6D1550}" destId="{17E720BB-EAC1-4B89-A7BE-7B928C1D01EE}" srcOrd="0" destOrd="0" presId="urn:diagrams.loki3.com/BracketList"/>
     <dgm:cxn modelId="{52A5041E-8CF9-4A39-9259-EA24EC29A410}" srcId="{2DE707DF-5DD0-469D-95CC-3EDCFF6229C8}" destId="{B14E95B8-495B-47C9-AB60-A80D542BF319}" srcOrd="1" destOrd="0" parTransId="{A127CF5C-8250-4260-979C-AB5BDF09DB1A}" sibTransId="{1DFF8E71-7953-4698-93BF-CF40A60702AF}"/>
+    <dgm:cxn modelId="{17E0D81F-61DA-41D6-9294-18BBA8DA1B1F}" srcId="{2DE707DF-5DD0-469D-95CC-3EDCFF6229C8}" destId="{BFE2B4A8-3A82-43C8-AEFE-DAE1DFD0F29F}" srcOrd="2" destOrd="0" parTransId="{EB927EE1-127C-4C7A-9212-2872CF1424EE}" sibTransId="{9D2A1A1A-F5C2-4751-8768-C4C0295B2371}"/>
     <dgm:cxn modelId="{5B687220-9F84-48F7-804C-28315D1B85F3}" type="presOf" srcId="{B14E95B8-495B-47C9-AB60-A80D542BF319}" destId="{0E38AF02-2348-43AB-A9C3-A72B9264AFBB}" srcOrd="0" destOrd="1" presId="urn:diagrams.loki3.com/BracketList"/>
-    <dgm:cxn modelId="{9F5A4529-29C4-468A-AF0F-884B3D952BBA}" srcId="{2DE707DF-5DD0-469D-95CC-3EDCFF6229C8}" destId="{E699AFC3-9340-4418-A203-EB71A1721C79}" srcOrd="2" destOrd="0" parTransId="{7A8A76F5-6237-4B33-ADCF-6422C3A436F6}" sibTransId="{CDE67D49-191C-40A2-A9A7-FB0AF6BA9695}"/>
-    <dgm:cxn modelId="{E8D9B634-FC0B-483D-AAD2-CDD23470E9EF}" type="presOf" srcId="{4D275DDA-1B3F-4CF4-A2B6-6B56DCF77E5F}" destId="{96FC612B-20CF-4206-819B-CEC18249E601}" srcOrd="0" destOrd="2" presId="urn:diagrams.loki3.com/BracketList"/>
+    <dgm:cxn modelId="{9F5A4529-29C4-468A-AF0F-884B3D952BBA}" srcId="{2DE707DF-5DD0-469D-95CC-3EDCFF6229C8}" destId="{E699AFC3-9340-4418-A203-EB71A1721C79}" srcOrd="3" destOrd="0" parTransId="{7A8A76F5-6237-4B33-ADCF-6422C3A436F6}" sibTransId="{CDE67D49-191C-40A2-A9A7-FB0AF6BA9695}"/>
     <dgm:cxn modelId="{39C6E935-F5A2-4A51-8C7B-AA0A42431196}" type="presOf" srcId="{2DE707DF-5DD0-469D-95CC-3EDCFF6229C8}" destId="{03C6D065-93A1-48D7-9FA6-367742B8F4F1}" srcOrd="0" destOrd="0" presId="urn:diagrams.loki3.com/BracketList"/>
     <dgm:cxn modelId="{5300643E-3DCE-46E8-B059-F31E819A5B5E}" srcId="{C1A7DBFA-56E5-489B-B629-EC79D92693C4}" destId="{4035D379-A683-4B1C-9920-2FB65D6D1550}" srcOrd="0" destOrd="0" parTransId="{49372862-3C02-44D8-8D5A-D5B8BF44A611}" sibTransId="{BB8A16F4-323A-40C8-AD4C-93CB1714ADC6}"/>
     <dgm:cxn modelId="{ECC9A042-261F-4321-9BF8-8C55FA033F1A}" type="presOf" srcId="{008A0E58-AA06-4717-B26C-F9D47F744092}" destId="{96FC612B-20CF-4206-819B-CEC18249E601}" srcOrd="0" destOrd="0" presId="urn:diagrams.loki3.com/BracketList"/>
     <dgm:cxn modelId="{C6FB1A64-CF87-48C6-A571-72C4EE385601}" srcId="{FF264AF5-71B3-49DA-A72C-879BB77C16D5}" destId="{802F735D-8FE1-4DF5-8560-DE91DD50028B}" srcOrd="2" destOrd="0" parTransId="{0A00DB93-CADF-47E1-BD08-C7D27BC70D42}" sibTransId="{610455CF-83B3-4D0D-A8BF-D681E430125D}"/>
-    <dgm:cxn modelId="{FE632249-5348-46F4-96B2-6CC3CB4C4B51}" srcId="{802F735D-8FE1-4DF5-8560-DE91DD50028B}" destId="{F32EEE3E-FC17-47BE-8268-D952E5A474FB}" srcOrd="1" destOrd="0" parTransId="{09DB2CCC-73C4-4E2B-BECD-5DB397951768}" sibTransId="{0E9A4B41-1F14-46EC-9A29-2F189BB6A509}"/>
-    <dgm:cxn modelId="{944D4A49-F355-4A7A-B69E-CDF3BF5C4EC9}" srcId="{2DE707DF-5DD0-469D-95CC-3EDCFF6229C8}" destId="{DA4C9581-E5B5-42F6-B806-165CE680C5BC}" srcOrd="3" destOrd="0" parTransId="{2E46E8CE-735C-431C-B635-CAEBDFDDE692}" sibTransId="{DC5E37B1-3BBF-4DA0-9775-9402839009D9}"/>
-    <dgm:cxn modelId="{CFD9836D-C353-4DC5-A299-20000DA2976C}" type="presOf" srcId="{E699AFC3-9340-4418-A203-EB71A1721C79}" destId="{0E38AF02-2348-43AB-A9C3-A72B9264AFBB}" srcOrd="0" destOrd="2" presId="urn:diagrams.loki3.com/BracketList"/>
+    <dgm:cxn modelId="{FE632249-5348-46F4-96B2-6CC3CB4C4B51}" srcId="{802F735D-8FE1-4DF5-8560-DE91DD50028B}" destId="{F32EEE3E-FC17-47BE-8268-D952E5A474FB}" srcOrd="2" destOrd="0" parTransId="{09DB2CCC-73C4-4E2B-BECD-5DB397951768}" sibTransId="{0E9A4B41-1F14-46EC-9A29-2F189BB6A509}"/>
+    <dgm:cxn modelId="{CFD9836D-C353-4DC5-A299-20000DA2976C}" type="presOf" srcId="{E699AFC3-9340-4418-A203-EB71A1721C79}" destId="{0E38AF02-2348-43AB-A9C3-A72B9264AFBB}" srcOrd="0" destOrd="3" presId="urn:diagrams.loki3.com/BracketList"/>
     <dgm:cxn modelId="{5673D16F-4012-45BD-A58B-C32A74013884}" type="presOf" srcId="{6DF08413-CCD1-4B04-A434-CF9D91B16DB5}" destId="{0E38AF02-2348-43AB-A9C3-A72B9264AFBB}" srcOrd="0" destOrd="0" presId="urn:diagrams.loki3.com/BracketList"/>
     <dgm:cxn modelId="{882F1753-3742-49C0-9E40-6E4FDCE7182D}" srcId="{2DE707DF-5DD0-469D-95CC-3EDCFF6229C8}" destId="{6DF08413-CCD1-4B04-A434-CF9D91B16DB5}" srcOrd="0" destOrd="0" parTransId="{992E60FD-048A-42C6-8C97-1DD27368D347}" sibTransId="{C7E8F9E7-F719-44A1-A824-01D0D17B0B74}"/>
-    <dgm:cxn modelId="{3551347C-C88A-43C1-9928-618DA9730942}" type="presOf" srcId="{DA4C9581-E5B5-42F6-B806-165CE680C5BC}" destId="{0E38AF02-2348-43AB-A9C3-A72B9264AFBB}" srcOrd="0" destOrd="3" presId="urn:diagrams.loki3.com/BracketList"/>
     <dgm:cxn modelId="{A25B2783-10AC-4D8B-8518-5A3738086D47}" srcId="{802F735D-8FE1-4DF5-8560-DE91DD50028B}" destId="{008A0E58-AA06-4717-B26C-F9D47F744092}" srcOrd="0" destOrd="0" parTransId="{204E47EB-A520-4AEE-851C-A432F775976B}" sibTransId="{7C5DCA00-E9D4-4820-BE7D-FFADDD1BA15B}"/>
-    <dgm:cxn modelId="{A96FF89C-9997-44CF-ADC1-C658AB77F41F}" type="presOf" srcId="{F32EEE3E-FC17-47BE-8268-D952E5A474FB}" destId="{96FC612B-20CF-4206-819B-CEC18249E601}" srcOrd="0" destOrd="1" presId="urn:diagrams.loki3.com/BracketList"/>
+    <dgm:cxn modelId="{BDB5C896-722C-4145-8497-73F71954A43A}" type="presOf" srcId="{BFE2B4A8-3A82-43C8-AEFE-DAE1DFD0F29F}" destId="{0E38AF02-2348-43AB-A9C3-A72B9264AFBB}" srcOrd="0" destOrd="2" presId="urn:diagrams.loki3.com/BracketList"/>
+    <dgm:cxn modelId="{A96FF89C-9997-44CF-ADC1-C658AB77F41F}" type="presOf" srcId="{F32EEE3E-FC17-47BE-8268-D952E5A474FB}" destId="{96FC612B-20CF-4206-819B-CEC18249E601}" srcOrd="0" destOrd="2" presId="urn:diagrams.loki3.com/BracketList"/>
+    <dgm:cxn modelId="{0EB239A4-3CE1-464F-A8B7-701B26FB0052}" type="presOf" srcId="{766ED039-BEA2-4440-9C22-6D0C2A62CCB3}" destId="{96FC612B-20CF-4206-819B-CEC18249E601}" srcOrd="0" destOrd="1" presId="urn:diagrams.loki3.com/BracketList"/>
     <dgm:cxn modelId="{3EC1BAAA-394F-41C0-BEA6-FFA976CED4CC}" type="presOf" srcId="{FF264AF5-71B3-49DA-A72C-879BB77C16D5}" destId="{3E31015A-2547-41E3-8E7D-5AF4DCB0FF13}" srcOrd="0" destOrd="0" presId="urn:diagrams.loki3.com/BracketList"/>
     <dgm:cxn modelId="{6E5F4DAB-8F3D-4D3E-A3B6-75654047ACBF}" type="presOf" srcId="{C1A7DBFA-56E5-489B-B629-EC79D92693C4}" destId="{06453A9C-E98E-4552-9065-CE5389F9D763}" srcOrd="0" destOrd="0" presId="urn:diagrams.loki3.com/BracketList"/>
     <dgm:cxn modelId="{DCA01EAD-4D0F-4410-AD89-7F106E7BD51A}" srcId="{FF264AF5-71B3-49DA-A72C-879BB77C16D5}" destId="{2DE707DF-5DD0-469D-95CC-3EDCFF6229C8}" srcOrd="0" destOrd="0" parTransId="{5A504EE3-704B-4065-984B-FFFEE3B2217A}" sibTransId="{07CFCC1D-62C1-4045-8BCD-5B6A7D6AD472}"/>
     <dgm:cxn modelId="{2EFDA5AE-51CC-48D6-B811-D89F4C5B7A18}" srcId="{FF264AF5-71B3-49DA-A72C-879BB77C16D5}" destId="{C1A7DBFA-56E5-489B-B629-EC79D92693C4}" srcOrd="1" destOrd="0" parTransId="{CBE19312-1E9B-4D50-9680-A141EA482CAC}" sibTransId="{7C765C3A-0D47-4D8A-ABAA-D7E0BE0477AA}"/>
-    <dgm:cxn modelId="{F60609EE-CE22-437A-8896-A62FF9018ECA}" srcId="{802F735D-8FE1-4DF5-8560-DE91DD50028B}" destId="{4D275DDA-1B3F-4CF4-A2B6-6B56DCF77E5F}" srcOrd="2" destOrd="0" parTransId="{EA711F69-C256-44B4-B7A9-D1CB39DB6CFA}" sibTransId="{9993045D-67DF-44A2-B95D-F65F418E09B0}"/>
     <dgm:cxn modelId="{19557BEE-B8F1-4F62-9B46-84212DEC854B}" type="presOf" srcId="{802F735D-8FE1-4DF5-8560-DE91DD50028B}" destId="{C98015E9-F00B-4F14-A25C-4E45691A8650}" srcOrd="0" destOrd="0" presId="urn:diagrams.loki3.com/BracketList"/>
+    <dgm:cxn modelId="{2845C2F0-839B-427C-A695-030DAE821BF6}" srcId="{802F735D-8FE1-4DF5-8560-DE91DD50028B}" destId="{766ED039-BEA2-4440-9C22-6D0C2A62CCB3}" srcOrd="1" destOrd="0" parTransId="{2448C8FC-96FC-44EE-927D-2425D5DA3BFB}" sibTransId="{50E9031D-D8FB-4323-979E-11907E1A487C}"/>
     <dgm:cxn modelId="{DFEB0155-FADE-4974-BE73-788E68FB2349}" type="presParOf" srcId="{3E31015A-2547-41E3-8E7D-5AF4DCB0FF13}" destId="{4FF9B843-BECD-4347-930C-866EE8199218}" srcOrd="0" destOrd="0" presId="urn:diagrams.loki3.com/BracketList"/>
     <dgm:cxn modelId="{E2525721-DA8B-4943-A932-06885A652A7E}" type="presParOf" srcId="{4FF9B843-BECD-4347-930C-866EE8199218}" destId="{03C6D065-93A1-48D7-9FA6-367742B8F4F1}" srcOrd="0" destOrd="0" presId="urn:diagrams.loki3.com/BracketList"/>
     <dgm:cxn modelId="{DE7FC344-8FFE-4753-9401-91EE2557EB47}" type="presParOf" srcId="{4FF9B843-BECD-4347-930C-866EE8199218}" destId="{06C27199-8000-4AE6-9705-FB690292F326}" srcOrd="1" destOrd="0" presId="urn:diagrams.loki3.com/BracketList"/>
@@ -1512,7 +1511,7 @@
       </dsp:nvSpPr>
       <dsp:spPr>
         <a:xfrm>
-          <a:off x="3480" y="1240060"/>
+          <a:off x="3480" y="1376185"/>
           <a:ext cx="1780492" cy="396000"/>
         </a:xfrm>
         <a:prstGeom prst="rect">
@@ -1561,7 +1560,7 @@
         </a:p>
       </dsp:txBody>
       <dsp:txXfrm>
-        <a:off x="3480" y="1240060"/>
+        <a:off x="3480" y="1376185"/>
         <a:ext cx="1780492" cy="396000"/>
       </dsp:txXfrm>
     </dsp:sp>
@@ -1572,7 +1571,7 @@
       </dsp:nvSpPr>
       <dsp:spPr>
         <a:xfrm>
-          <a:off x="1783973" y="769810"/>
+          <a:off x="1783973" y="905935"/>
           <a:ext cx="356098" cy="1336500"/>
         </a:xfrm>
         <a:prstGeom prst="leftBrace">
@@ -1616,7 +1615,7 @@
       </dsp:nvSpPr>
       <dsp:spPr>
         <a:xfrm>
-          <a:off x="2282511" y="769810"/>
+          <a:off x="2282511" y="905935"/>
           <a:ext cx="4842940" cy="1336500"/>
         </a:xfrm>
         <a:prstGeom prst="rect">
@@ -1713,7 +1712,7 @@
           </a:pPr>
           <a:r>
             <a:rPr lang="de-CH" sz="2000" kern="1200" dirty="0"/>
-            <a:t>Spring Web &amp; Security</a:t>
+            <a:t>Integrierter Swagger-Client</a:t>
           </a:r>
         </a:p>
         <a:p>
@@ -1731,12 +1730,12 @@
           </a:pPr>
           <a:r>
             <a:rPr lang="de-CH" sz="2000" kern="1200" dirty="0"/>
-            <a:t>Integrierter Swagger-Client</a:t>
+            <a:t>Spring Web &amp; Security</a:t>
           </a:r>
         </a:p>
       </dsp:txBody>
       <dsp:txXfrm>
-        <a:off x="2282511" y="769810"/>
+        <a:off x="2282511" y="905935"/>
         <a:ext cx="4842940" cy="1336500"/>
       </dsp:txXfrm>
     </dsp:sp>
@@ -1747,7 +1746,7 @@
       </dsp:nvSpPr>
       <dsp:spPr>
         <a:xfrm>
-          <a:off x="3480" y="2190685"/>
+          <a:off x="3480" y="2326810"/>
           <a:ext cx="1780492" cy="396000"/>
         </a:xfrm>
         <a:prstGeom prst="rect">
@@ -1796,7 +1795,7 @@
         </a:p>
       </dsp:txBody>
       <dsp:txXfrm>
-        <a:off x="3480" y="2190685"/>
+        <a:off x="3480" y="2326810"/>
         <a:ext cx="1780492" cy="396000"/>
       </dsp:txXfrm>
     </dsp:sp>
@@ -1807,7 +1806,7 @@
       </dsp:nvSpPr>
       <dsp:spPr>
         <a:xfrm>
-          <a:off x="1783973" y="2178310"/>
+          <a:off x="1783973" y="2314435"/>
           <a:ext cx="356098" cy="420750"/>
         </a:xfrm>
         <a:prstGeom prst="leftBrace">
@@ -1851,7 +1850,7 @@
       </dsp:nvSpPr>
       <dsp:spPr>
         <a:xfrm>
-          <a:off x="2282511" y="2178310"/>
+          <a:off x="2282511" y="2314435"/>
           <a:ext cx="4842940" cy="420750"/>
         </a:xfrm>
         <a:prstGeom prst="rect">
@@ -1917,7 +1916,7 @@
         </a:p>
       </dsp:txBody>
       <dsp:txXfrm>
-        <a:off x="2282511" y="2178310"/>
+        <a:off x="2282511" y="2314435"/>
         <a:ext cx="4842940" cy="420750"/>
       </dsp:txXfrm>
     </dsp:sp>
@@ -1988,8 +1987,8 @@
       </dsp:nvSpPr>
       <dsp:spPr>
         <a:xfrm>
-          <a:off x="1783973" y="2671060"/>
-          <a:ext cx="356098" cy="1311750"/>
+          <a:off x="1783973" y="2807185"/>
+          <a:ext cx="356098" cy="1039500"/>
         </a:xfrm>
         <a:prstGeom prst="leftBrace">
           <a:avLst>
@@ -2032,8 +2031,8 @@
       </dsp:nvSpPr>
       <dsp:spPr>
         <a:xfrm>
-          <a:off x="2282511" y="2671060"/>
-          <a:ext cx="4842940" cy="1311750"/>
+          <a:off x="2282511" y="2807185"/>
+          <a:ext cx="4842940" cy="1039500"/>
         </a:xfrm>
         <a:prstGeom prst="rect">
           <a:avLst/>
@@ -2111,15 +2110,8 @@
           </a:pPr>
           <a:r>
             <a:rPr lang="de-CH" sz="2000" kern="1200" dirty="0"/>
-            <a:t>Mapping DTO </a:t>
+            <a:t>jOOQ JDBC</a:t>
           </a:r>
-          <a:r>
-            <a:rPr lang="de-CH" sz="2000" kern="1200" dirty="0">
-              <a:sym typeface="Wingdings" panose="05000000000000000000" pitchFamily="2" charset="2"/>
-            </a:rPr>
-            <a:t> Entity mit MapStruct</a:t>
-          </a:r>
-          <a:endParaRPr lang="de-CH" sz="2000" kern="1200" dirty="0"/>
         </a:p>
         <a:p>
           <a:pPr marL="228600" lvl="1" indent="-228600" algn="l" defTabSz="889000">
@@ -2136,13 +2128,20 @@
           </a:pPr>
           <a:r>
             <a:rPr lang="de-CH" sz="2000" kern="1200" dirty="0"/>
-            <a:t>jOOQ JDBC DSL</a:t>
+            <a:t>MapStruct (Mapping DTO </a:t>
           </a:r>
+          <a:r>
+            <a:rPr lang="de-CH" sz="2000" kern="1200" dirty="0">
+              <a:sym typeface="Wingdings" panose="05000000000000000000" pitchFamily="2" charset="2"/>
+            </a:rPr>
+            <a:t> Entity)</a:t>
+          </a:r>
+          <a:endParaRPr lang="de-CH" sz="2000" kern="1200" dirty="0"/>
         </a:p>
       </dsp:txBody>
       <dsp:txXfrm>
-        <a:off x="2282511" y="2671060"/>
-        <a:ext cx="4842940" cy="1311750"/>
+        <a:off x="2282511" y="2807185"/>
+        <a:ext cx="4842940" cy="1039500"/>
       </dsp:txXfrm>
     </dsp:sp>
   </dsp:spTree>
@@ -3438,14 +3437,14 @@
           <a:effectLst/>
           <a:extLst>
             <a:ext uri="{909E8E84-426E-40dd-AFC4-6F175D3DCCD1}">
-              <a14:hiddenFill xmlns:a14="http://schemas.microsoft.com/office/drawing/2010/main" xmlns="">
+              <a14:hiddenFill xmlns="" xmlns:a14="http://schemas.microsoft.com/office/drawing/2010/main">
                 <a:solidFill>
                   <a:schemeClr val="accent1"/>
                 </a:solidFill>
               </a14:hiddenFill>
             </a:ext>
             <a:ext uri="{91240B29-F687-4f45-9708-019B960494DF}">
-              <a14:hiddenLine xmlns:a14="http://schemas.microsoft.com/office/drawing/2010/main" xmlns="" w="9525">
+              <a14:hiddenLine xmlns="" xmlns:a14="http://schemas.microsoft.com/office/drawing/2010/main" w="9525">
                 <a:solidFill>
                   <a:schemeClr val="tx1"/>
                 </a:solidFill>
@@ -3455,7 +3454,7 @@
               </a14:hiddenLine>
             </a:ext>
             <a:ext uri="{AF507438-7753-43e0-B8FC-AC1667EBCBE1}">
-              <a14:hiddenEffects xmlns:a14="http://schemas.microsoft.com/office/drawing/2010/main" xmlns="">
+              <a14:hiddenEffects xmlns="" xmlns:a14="http://schemas.microsoft.com/office/drawing/2010/main">
                 <a:effectLst>
                   <a:outerShdw dist="35921" dir="2700000" algn="ctr" rotWithShape="0">
                     <a:schemeClr val="bg2"/>
@@ -3506,14 +3505,14 @@
           <a:effectLst/>
           <a:extLst>
             <a:ext uri="{909E8E84-426E-40dd-AFC4-6F175D3DCCD1}">
-              <a14:hiddenFill xmlns:a14="http://schemas.microsoft.com/office/drawing/2010/main" xmlns="">
+              <a14:hiddenFill xmlns="" xmlns:a14="http://schemas.microsoft.com/office/drawing/2010/main">
                 <a:solidFill>
                   <a:schemeClr val="accent1"/>
                 </a:solidFill>
               </a14:hiddenFill>
             </a:ext>
             <a:ext uri="{91240B29-F687-4f45-9708-019B960494DF}">
-              <a14:hiddenLine xmlns:a14="http://schemas.microsoft.com/office/drawing/2010/main" xmlns="" w="9525">
+              <a14:hiddenLine xmlns="" xmlns:a14="http://schemas.microsoft.com/office/drawing/2010/main" w="9525">
                 <a:solidFill>
                   <a:schemeClr val="tx1"/>
                 </a:solidFill>
@@ -3523,7 +3522,7 @@
               </a14:hiddenLine>
             </a:ext>
             <a:ext uri="{AF507438-7753-43e0-B8FC-AC1667EBCBE1}">
-              <a14:hiddenEffects xmlns:a14="http://schemas.microsoft.com/office/drawing/2010/main" xmlns="">
+              <a14:hiddenEffects xmlns="" xmlns:a14="http://schemas.microsoft.com/office/drawing/2010/main">
                 <a:effectLst>
                   <a:outerShdw dist="35921" dir="2700000" algn="ctr" rotWithShape="0">
                     <a:schemeClr val="bg2"/>
@@ -3574,14 +3573,14 @@
           <a:effectLst/>
           <a:extLst>
             <a:ext uri="{909E8E84-426E-40dd-AFC4-6F175D3DCCD1}">
-              <a14:hiddenFill xmlns:a14="http://schemas.microsoft.com/office/drawing/2010/main" xmlns="">
+              <a14:hiddenFill xmlns="" xmlns:a14="http://schemas.microsoft.com/office/drawing/2010/main">
                 <a:solidFill>
                   <a:schemeClr val="accent1"/>
                 </a:solidFill>
               </a14:hiddenFill>
             </a:ext>
             <a:ext uri="{91240B29-F687-4f45-9708-019B960494DF}">
-              <a14:hiddenLine xmlns:a14="http://schemas.microsoft.com/office/drawing/2010/main" xmlns="" w="9525">
+              <a14:hiddenLine xmlns="" xmlns:a14="http://schemas.microsoft.com/office/drawing/2010/main" w="9525">
                 <a:solidFill>
                   <a:schemeClr val="tx1"/>
                 </a:solidFill>
@@ -3591,7 +3590,7 @@
               </a14:hiddenLine>
             </a:ext>
             <a:ext uri="{AF507438-7753-43e0-B8FC-AC1667EBCBE1}">
-              <a14:hiddenEffects xmlns:a14="http://schemas.microsoft.com/office/drawing/2010/main" xmlns="">
+              <a14:hiddenEffects xmlns="" xmlns:a14="http://schemas.microsoft.com/office/drawing/2010/main">
                 <a:effectLst>
                   <a:outerShdw dist="35921" dir="2700000" algn="ctr" rotWithShape="0">
                     <a:schemeClr val="bg2"/>
@@ -3642,14 +3641,14 @@
           <a:effectLst/>
           <a:extLst>
             <a:ext uri="{909E8E84-426E-40dd-AFC4-6F175D3DCCD1}">
-              <a14:hiddenFill xmlns:a14="http://schemas.microsoft.com/office/drawing/2010/main" xmlns="">
+              <a14:hiddenFill xmlns="" xmlns:a14="http://schemas.microsoft.com/office/drawing/2010/main">
                 <a:solidFill>
                   <a:schemeClr val="accent1"/>
                 </a:solidFill>
               </a14:hiddenFill>
             </a:ext>
             <a:ext uri="{91240B29-F687-4f45-9708-019B960494DF}">
-              <a14:hiddenLine xmlns:a14="http://schemas.microsoft.com/office/drawing/2010/main" xmlns="" w="9525">
+              <a14:hiddenLine xmlns="" xmlns:a14="http://schemas.microsoft.com/office/drawing/2010/main" w="9525">
                 <a:solidFill>
                   <a:schemeClr val="tx1"/>
                 </a:solidFill>
@@ -3659,7 +3658,7 @@
               </a14:hiddenLine>
             </a:ext>
             <a:ext uri="{AF507438-7753-43e0-B8FC-AC1667EBCBE1}">
-              <a14:hiddenEffects xmlns:a14="http://schemas.microsoft.com/office/drawing/2010/main" xmlns="">
+              <a14:hiddenEffects xmlns="" xmlns:a14="http://schemas.microsoft.com/office/drawing/2010/main">
                 <a:effectLst>
                   <a:outerShdw dist="35921" dir="2700000" algn="ctr" rotWithShape="0">
                     <a:schemeClr val="bg2"/>
@@ -3751,14 +3750,14 @@
           <a:effectLst/>
           <a:extLst>
             <a:ext uri="{909E8E84-426E-40dd-AFC4-6F175D3DCCD1}">
-              <a14:hiddenFill xmlns:a14="http://schemas.microsoft.com/office/drawing/2010/main" xmlns="">
+              <a14:hiddenFill xmlns="" xmlns:a14="http://schemas.microsoft.com/office/drawing/2010/main">
                 <a:solidFill>
                   <a:schemeClr val="accent1"/>
                 </a:solidFill>
               </a14:hiddenFill>
             </a:ext>
             <a:ext uri="{91240B29-F687-4f45-9708-019B960494DF}">
-              <a14:hiddenLine xmlns:a14="http://schemas.microsoft.com/office/drawing/2010/main" xmlns="" w="9525">
+              <a14:hiddenLine xmlns="" xmlns:a14="http://schemas.microsoft.com/office/drawing/2010/main" w="9525">
                 <a:solidFill>
                   <a:schemeClr val="tx1"/>
                 </a:solidFill>
@@ -3768,7 +3767,7 @@
               </a14:hiddenLine>
             </a:ext>
             <a:ext uri="{AF507438-7753-43e0-B8FC-AC1667EBCBE1}">
-              <a14:hiddenEffects xmlns:a14="http://schemas.microsoft.com/office/drawing/2010/main" xmlns="">
+              <a14:hiddenEffects xmlns="" xmlns:a14="http://schemas.microsoft.com/office/drawing/2010/main">
                 <a:effectLst>
                   <a:outerShdw dist="35921" dir="2700000" algn="ctr" rotWithShape="0">
                     <a:schemeClr val="bg2"/>
@@ -3819,14 +3818,14 @@
           <a:effectLst/>
           <a:extLst>
             <a:ext uri="{909E8E84-426E-40dd-AFC4-6F175D3DCCD1}">
-              <a14:hiddenFill xmlns:a14="http://schemas.microsoft.com/office/drawing/2010/main" xmlns="">
+              <a14:hiddenFill xmlns="" xmlns:a14="http://schemas.microsoft.com/office/drawing/2010/main">
                 <a:solidFill>
                   <a:schemeClr val="accent1"/>
                 </a:solidFill>
               </a14:hiddenFill>
             </a:ext>
             <a:ext uri="{91240B29-F687-4f45-9708-019B960494DF}">
-              <a14:hiddenLine xmlns:a14="http://schemas.microsoft.com/office/drawing/2010/main" xmlns="" w="9525">
+              <a14:hiddenLine xmlns="" xmlns:a14="http://schemas.microsoft.com/office/drawing/2010/main" w="9525">
                 <a:solidFill>
                   <a:schemeClr val="tx1"/>
                 </a:solidFill>
@@ -3836,7 +3835,7 @@
               </a14:hiddenLine>
             </a:ext>
             <a:ext uri="{AF507438-7753-43e0-B8FC-AC1667EBCBE1}">
-              <a14:hiddenEffects xmlns:a14="http://schemas.microsoft.com/office/drawing/2010/main" xmlns="">
+              <a14:hiddenEffects xmlns="" xmlns:a14="http://schemas.microsoft.com/office/drawing/2010/main">
                 <a:effectLst>
                   <a:outerShdw dist="35921" dir="2700000" algn="ctr" rotWithShape="0">
                     <a:schemeClr val="bg2"/>
@@ -3892,7 +3891,7 @@
           <a:effectLst/>
           <a:extLst>
             <a:ext uri="{AF507438-7753-43e0-B8FC-AC1667EBCBE1}">
-              <a14:hiddenEffects xmlns:a14="http://schemas.microsoft.com/office/drawing/2010/main" xmlns="">
+              <a14:hiddenEffects xmlns="" xmlns:a14="http://schemas.microsoft.com/office/drawing/2010/main">
                 <a:effectLst>
                   <a:outerShdw dist="35921" dir="2700000" algn="ctr" rotWithShape="0">
                     <a:srgbClr val="808080"/>
@@ -3901,7 +3900,7 @@
               </a14:hiddenEffects>
             </a:ext>
             <a:ext uri="{53640926-AAD7-44d8-BBD7-CCE9431645EC}">
-              <a14:shadowObscured xmlns:a14="http://schemas.microsoft.com/office/drawing/2010/main" xmlns="" val="1"/>
+              <a14:shadowObscured xmlns="" xmlns:a14="http://schemas.microsoft.com/office/drawing/2010/main" val="1"/>
             </a:ext>
           </a:extLst>
         </p:spPr>
@@ -3931,14 +3930,14 @@
           <a:effectLst/>
           <a:extLst>
             <a:ext uri="{909E8E84-426E-40dd-AFC4-6F175D3DCCD1}">
-              <a14:hiddenFill xmlns:a14="http://schemas.microsoft.com/office/drawing/2010/main" xmlns="">
+              <a14:hiddenFill xmlns="" xmlns:a14="http://schemas.microsoft.com/office/drawing/2010/main">
                 <a:solidFill>
                   <a:schemeClr val="accent1"/>
                 </a:solidFill>
               </a14:hiddenFill>
             </a:ext>
             <a:ext uri="{91240B29-F687-4f45-9708-019B960494DF}">
-              <a14:hiddenLine xmlns:a14="http://schemas.microsoft.com/office/drawing/2010/main" xmlns="" w="9525">
+              <a14:hiddenLine xmlns="" xmlns:a14="http://schemas.microsoft.com/office/drawing/2010/main" w="9525">
                 <a:solidFill>
                   <a:schemeClr val="tx1"/>
                 </a:solidFill>
@@ -3948,7 +3947,7 @@
               </a14:hiddenLine>
             </a:ext>
             <a:ext uri="{AF507438-7753-43e0-B8FC-AC1667EBCBE1}">
-              <a14:hiddenEffects xmlns:a14="http://schemas.microsoft.com/office/drawing/2010/main" xmlns="">
+              <a14:hiddenEffects xmlns="" xmlns:a14="http://schemas.microsoft.com/office/drawing/2010/main">
                 <a:effectLst>
                   <a:outerShdw dist="35921" dir="2700000" algn="ctr" rotWithShape="0">
                     <a:schemeClr val="bg2"/>
@@ -4027,14 +4026,14 @@
           <a:effectLst/>
           <a:extLst>
             <a:ext uri="{909E8E84-426E-40dd-AFC4-6F175D3DCCD1}">
-              <a14:hiddenFill xmlns:a14="http://schemas.microsoft.com/office/drawing/2010/main" xmlns="">
+              <a14:hiddenFill xmlns="" xmlns:a14="http://schemas.microsoft.com/office/drawing/2010/main">
                 <a:solidFill>
                   <a:schemeClr val="accent1"/>
                 </a:solidFill>
               </a14:hiddenFill>
             </a:ext>
             <a:ext uri="{91240B29-F687-4f45-9708-019B960494DF}">
-              <a14:hiddenLine xmlns:a14="http://schemas.microsoft.com/office/drawing/2010/main" xmlns="" w="9525">
+              <a14:hiddenLine xmlns="" xmlns:a14="http://schemas.microsoft.com/office/drawing/2010/main" w="9525">
                 <a:solidFill>
                   <a:schemeClr val="tx1"/>
                 </a:solidFill>
@@ -4044,7 +4043,7 @@
               </a14:hiddenLine>
             </a:ext>
             <a:ext uri="{AF507438-7753-43e0-B8FC-AC1667EBCBE1}">
-              <a14:hiddenEffects xmlns:a14="http://schemas.microsoft.com/office/drawing/2010/main" xmlns="">
+              <a14:hiddenEffects xmlns="" xmlns:a14="http://schemas.microsoft.com/office/drawing/2010/main">
                 <a:effectLst>
                   <a:outerShdw dist="35921" dir="2700000" algn="ctr" rotWithShape="0">
                     <a:schemeClr val="bg2"/>
@@ -4095,14 +4094,14 @@
           <a:effectLst/>
           <a:extLst>
             <a:ext uri="{909E8E84-426E-40dd-AFC4-6F175D3DCCD1}">
-              <a14:hiddenFill xmlns:a14="http://schemas.microsoft.com/office/drawing/2010/main" xmlns="">
+              <a14:hiddenFill xmlns="" xmlns:a14="http://schemas.microsoft.com/office/drawing/2010/main">
                 <a:solidFill>
                   <a:schemeClr val="accent1"/>
                 </a:solidFill>
               </a14:hiddenFill>
             </a:ext>
             <a:ext uri="{91240B29-F687-4f45-9708-019B960494DF}">
-              <a14:hiddenLine xmlns:a14="http://schemas.microsoft.com/office/drawing/2010/main" xmlns="" w="9525">
+              <a14:hiddenLine xmlns="" xmlns:a14="http://schemas.microsoft.com/office/drawing/2010/main" w="9525">
                 <a:solidFill>
                   <a:schemeClr val="tx1"/>
                 </a:solidFill>
@@ -4112,7 +4111,7 @@
               </a14:hiddenLine>
             </a:ext>
             <a:ext uri="{AF507438-7753-43e0-B8FC-AC1667EBCBE1}">
-              <a14:hiddenEffects xmlns:a14="http://schemas.microsoft.com/office/drawing/2010/main" xmlns="">
+              <a14:hiddenEffects xmlns="" xmlns:a14="http://schemas.microsoft.com/office/drawing/2010/main">
                 <a:effectLst>
                   <a:outerShdw dist="35921" dir="2700000" algn="ctr" rotWithShape="0">
                     <a:schemeClr val="bg2"/>
@@ -4315,14 +4314,14 @@
           <a:ln/>
           <a:extLst>
             <a:ext uri="{909E8E84-426E-40dd-AFC4-6F175D3DCCD1}">
-              <a14:hiddenFill xmlns:a14="http://schemas.microsoft.com/office/drawing/2010/main" xmlns="">
+              <a14:hiddenFill xmlns="" xmlns:a14="http://schemas.microsoft.com/office/drawing/2010/main">
                 <a:solidFill>
                   <a:srgbClr val="FFFFFF"/>
                 </a:solidFill>
               </a14:hiddenFill>
             </a:ext>
             <a:ext uri="{91240B29-F687-4f45-9708-019B960494DF}">
-              <a14:hiddenLine xmlns:a14="http://schemas.microsoft.com/office/drawing/2010/main" xmlns="" w="9525">
+              <a14:hiddenLine xmlns="" xmlns:a14="http://schemas.microsoft.com/office/drawing/2010/main" w="9525">
                 <a:solidFill>
                   <a:srgbClr val="000000"/>
                 </a:solidFill>
@@ -4591,7 +4590,7 @@
                   <a:srgbClr val="000000"/>
                 </a:solidFill>
               </a:rPr>
-              <a:t>26.04.2019</a:t>
+              <a:t>28.04.2019</a:t>
             </a:fld>
             <a:endParaRPr lang="de-CH" dirty="0">
               <a:solidFill>
@@ -4788,7 +4787,7 @@
                   <a:srgbClr val="000000"/>
                 </a:solidFill>
               </a:rPr>
-              <a:t>26.04.2019</a:t>
+              <a:t>28.04.2019</a:t>
             </a:fld>
             <a:endParaRPr lang="de-CH" dirty="0">
               <a:solidFill>
@@ -4989,7 +4988,7 @@
                   <a:srgbClr val="000000"/>
                 </a:solidFill>
               </a:rPr>
-              <a:t>26.04.2019</a:t>
+              <a:t>28.04.2019</a:t>
             </a:fld>
             <a:endParaRPr lang="de-CH" dirty="0">
               <a:solidFill>
@@ -5190,7 +5189,7 @@
                   <a:srgbClr val="000000"/>
                 </a:solidFill>
               </a:rPr>
-              <a:t>26.04.2019</a:t>
+              <a:t>28.04.2019</a:t>
             </a:fld>
             <a:endParaRPr lang="de-CH" dirty="0">
               <a:solidFill>
@@ -5431,14 +5430,14 @@
           <a:effectLst/>
           <a:extLst>
             <a:ext uri="{909E8E84-426E-40dd-AFC4-6F175D3DCCD1}">
-              <a14:hiddenFill xmlns:a14="http://schemas.microsoft.com/office/drawing/2010/main" xmlns="">
+              <a14:hiddenFill xmlns="" xmlns:a14="http://schemas.microsoft.com/office/drawing/2010/main">
                 <a:solidFill>
                   <a:schemeClr val="accent1"/>
                 </a:solidFill>
               </a14:hiddenFill>
             </a:ext>
             <a:ext uri="{91240B29-F687-4f45-9708-019B960494DF}">
-              <a14:hiddenLine xmlns:a14="http://schemas.microsoft.com/office/drawing/2010/main" xmlns="" w="9525">
+              <a14:hiddenLine xmlns="" xmlns:a14="http://schemas.microsoft.com/office/drawing/2010/main" w="9525">
                 <a:solidFill>
                   <a:schemeClr val="tx1"/>
                 </a:solidFill>
@@ -5448,7 +5447,7 @@
               </a14:hiddenLine>
             </a:ext>
             <a:ext uri="{AF507438-7753-43e0-B8FC-AC1667EBCBE1}">
-              <a14:hiddenEffects xmlns:a14="http://schemas.microsoft.com/office/drawing/2010/main" xmlns="">
+              <a14:hiddenEffects xmlns="" xmlns:a14="http://schemas.microsoft.com/office/drawing/2010/main">
                 <a:effectLst>
                   <a:outerShdw dist="35921" dir="2700000" algn="ctr" rotWithShape="0">
                     <a:schemeClr val="bg2"/>
@@ -5499,14 +5498,14 @@
           <a:effectLst/>
           <a:extLst>
             <a:ext uri="{909E8E84-426E-40dd-AFC4-6F175D3DCCD1}">
-              <a14:hiddenFill xmlns:a14="http://schemas.microsoft.com/office/drawing/2010/main" xmlns="">
+              <a14:hiddenFill xmlns="" xmlns:a14="http://schemas.microsoft.com/office/drawing/2010/main">
                 <a:solidFill>
                   <a:schemeClr val="accent1"/>
                 </a:solidFill>
               </a14:hiddenFill>
             </a:ext>
             <a:ext uri="{91240B29-F687-4f45-9708-019B960494DF}">
-              <a14:hiddenLine xmlns:a14="http://schemas.microsoft.com/office/drawing/2010/main" xmlns="" w="9525">
+              <a14:hiddenLine xmlns="" xmlns:a14="http://schemas.microsoft.com/office/drawing/2010/main" w="9525">
                 <a:solidFill>
                   <a:schemeClr val="tx1"/>
                 </a:solidFill>
@@ -5516,7 +5515,7 @@
               </a14:hiddenLine>
             </a:ext>
             <a:ext uri="{AF507438-7753-43e0-B8FC-AC1667EBCBE1}">
-              <a14:hiddenEffects xmlns:a14="http://schemas.microsoft.com/office/drawing/2010/main" xmlns="">
+              <a14:hiddenEffects xmlns="" xmlns:a14="http://schemas.microsoft.com/office/drawing/2010/main">
                 <a:effectLst>
                   <a:outerShdw dist="35921" dir="2700000" algn="ctr" rotWithShape="0">
                     <a:schemeClr val="bg2"/>
@@ -5595,14 +5594,14 @@
           <a:effectLst/>
           <a:extLst>
             <a:ext uri="{909E8E84-426E-40dd-AFC4-6F175D3DCCD1}">
-              <a14:hiddenFill xmlns:a14="http://schemas.microsoft.com/office/drawing/2010/main" xmlns="">
+              <a14:hiddenFill xmlns="" xmlns:a14="http://schemas.microsoft.com/office/drawing/2010/main">
                 <a:solidFill>
                   <a:schemeClr val="accent1"/>
                 </a:solidFill>
               </a14:hiddenFill>
             </a:ext>
             <a:ext uri="{91240B29-F687-4f45-9708-019B960494DF}">
-              <a14:hiddenLine xmlns:a14="http://schemas.microsoft.com/office/drawing/2010/main" xmlns="" w="9525">
+              <a14:hiddenLine xmlns="" xmlns:a14="http://schemas.microsoft.com/office/drawing/2010/main" w="9525">
                 <a:solidFill>
                   <a:schemeClr val="tx1"/>
                 </a:solidFill>
@@ -5612,7 +5611,7 @@
               </a14:hiddenLine>
             </a:ext>
             <a:ext uri="{AF507438-7753-43e0-B8FC-AC1667EBCBE1}">
-              <a14:hiddenEffects xmlns:a14="http://schemas.microsoft.com/office/drawing/2010/main" xmlns="">
+              <a14:hiddenEffects xmlns="" xmlns:a14="http://schemas.microsoft.com/office/drawing/2010/main">
                 <a:effectLst>
                   <a:outerShdw dist="35921" dir="2700000" algn="ctr" rotWithShape="0">
                     <a:schemeClr val="bg2"/>
@@ -5640,7 +5639,7 @@
                   <a:srgbClr val="000000"/>
                 </a:solidFill>
               </a:rPr>
-              <a:t>26.04.2019</a:t>
+              <a:t>28.04.2019</a:t>
             </a:fld>
             <a:endParaRPr lang="de-CH" dirty="0">
               <a:solidFill>
@@ -5675,14 +5674,14 @@
           <a:effectLst/>
           <a:extLst>
             <a:ext uri="{909E8E84-426E-40dd-AFC4-6F175D3DCCD1}">
-              <a14:hiddenFill xmlns:a14="http://schemas.microsoft.com/office/drawing/2010/main" xmlns="">
+              <a14:hiddenFill xmlns="" xmlns:a14="http://schemas.microsoft.com/office/drawing/2010/main">
                 <a:solidFill>
                   <a:schemeClr val="accent1"/>
                 </a:solidFill>
               </a14:hiddenFill>
             </a:ext>
             <a:ext uri="{91240B29-F687-4f45-9708-019B960494DF}">
-              <a14:hiddenLine xmlns:a14="http://schemas.microsoft.com/office/drawing/2010/main" xmlns="" w="9525">
+              <a14:hiddenLine xmlns="" xmlns:a14="http://schemas.microsoft.com/office/drawing/2010/main" w="9525">
                 <a:solidFill>
                   <a:schemeClr val="tx1"/>
                 </a:solidFill>
@@ -5692,7 +5691,7 @@
               </a14:hiddenLine>
             </a:ext>
             <a:ext uri="{AF507438-7753-43e0-B8FC-AC1667EBCBE1}">
-              <a14:hiddenEffects xmlns:a14="http://schemas.microsoft.com/office/drawing/2010/main" xmlns="">
+              <a14:hiddenEffects xmlns="" xmlns:a14="http://schemas.microsoft.com/office/drawing/2010/main">
                 <a:effectLst>
                   <a:outerShdw dist="35921" dir="2700000" algn="ctr" rotWithShape="0">
                     <a:schemeClr val="bg2"/>
@@ -5750,14 +5749,14 @@
           <a:effectLst/>
           <a:extLst>
             <a:ext uri="{909E8E84-426E-40dd-AFC4-6F175D3DCCD1}">
-              <a14:hiddenFill xmlns:a14="http://schemas.microsoft.com/office/drawing/2010/main" xmlns="">
+              <a14:hiddenFill xmlns="" xmlns:a14="http://schemas.microsoft.com/office/drawing/2010/main">
                 <a:solidFill>
                   <a:schemeClr val="accent1"/>
                 </a:solidFill>
               </a14:hiddenFill>
             </a:ext>
             <a:ext uri="{91240B29-F687-4f45-9708-019B960494DF}">
-              <a14:hiddenLine xmlns:a14="http://schemas.microsoft.com/office/drawing/2010/main" xmlns="" w="9525">
+              <a14:hiddenLine xmlns="" xmlns:a14="http://schemas.microsoft.com/office/drawing/2010/main" w="9525">
                 <a:solidFill>
                   <a:schemeClr val="tx1"/>
                 </a:solidFill>
@@ -5767,7 +5766,7 @@
               </a14:hiddenLine>
             </a:ext>
             <a:ext uri="{AF507438-7753-43e0-B8FC-AC1667EBCBE1}">
-              <a14:hiddenEffects xmlns:a14="http://schemas.microsoft.com/office/drawing/2010/main" xmlns="">
+              <a14:hiddenEffects xmlns="" xmlns:a14="http://schemas.microsoft.com/office/drawing/2010/main">
                 <a:effectLst>
                   <a:outerShdw dist="35921" dir="2700000" algn="ctr" rotWithShape="0">
                     <a:schemeClr val="bg2"/>
@@ -5834,12 +5833,12 @@
           <a:effectLst/>
           <a:extLst>
             <a:ext uri="{909E8E84-426E-40dd-AFC4-6F175D3DCCD1}">
-              <a14:hiddenFill xmlns:a14="http://schemas.microsoft.com/office/drawing/2010/main" xmlns="">
+              <a14:hiddenFill xmlns="" xmlns:a14="http://schemas.microsoft.com/office/drawing/2010/main">
                 <a:noFill/>
               </a14:hiddenFill>
             </a:ext>
             <a:ext uri="{AF507438-7753-43e0-B8FC-AC1667EBCBE1}">
-              <a14:hiddenEffects xmlns:a14="http://schemas.microsoft.com/office/drawing/2010/main" xmlns="">
+              <a14:hiddenEffects xmlns="" xmlns:a14="http://schemas.microsoft.com/office/drawing/2010/main">
                 <a:effectLst>
                   <a:outerShdw dist="35921" dir="2700000" algn="ctr" rotWithShape="0">
                     <a:schemeClr val="bg2"/>
@@ -6329,25 +6328,6 @@
       </p:grpSpPr>
       <p:sp>
         <p:nvSpPr>
-          <p:cNvPr id="12" name="Untertitel 11"/>
-          <p:cNvSpPr>
-            <a:spLocks noGrp="1"/>
-          </p:cNvSpPr>
-          <p:nvPr>
-            <p:ph type="subTitle" idx="1"/>
-          </p:nvPr>
-        </p:nvSpPr>
-        <p:spPr/>
-        <p:txBody>
-          <a:bodyPr/>
-          <a:lstStyle/>
-          <a:p>
-            <a:endParaRPr lang="de-CH" dirty="0"/>
-          </a:p>
-        </p:txBody>
-      </p:sp>
-      <p:sp>
-        <p:nvSpPr>
           <p:cNvPr id="11" name="Titel 10"/>
           <p:cNvSpPr>
             <a:spLocks noGrp="1"/>
@@ -6356,7 +6336,12 @@
             <p:ph type="title"/>
           </p:nvPr>
         </p:nvSpPr>
-        <p:spPr/>
+        <p:spPr>
+          <a:xfrm>
+            <a:off x="736600" y="1509713"/>
+            <a:ext cx="9213850" cy="361950"/>
+          </a:xfrm>
+        </p:spPr>
         <p:txBody>
           <a:bodyPr/>
           <a:lstStyle/>
@@ -6416,6 +6401,18 @@
             <a:endParaRPr lang="de-CH" dirty="0"/>
           </a:p>
           <a:p>
+            <a:endParaRPr lang="de-CH" dirty="0"/>
+          </a:p>
+          <a:p>
+            <a:endParaRPr lang="de-CH" dirty="0"/>
+          </a:p>
+          <a:p>
+            <a:endParaRPr lang="de-CH" dirty="0"/>
+          </a:p>
+          <a:p>
+            <a:endParaRPr lang="de-CH" dirty="0"/>
+          </a:p>
+          <a:p>
             <a:r>
               <a:rPr lang="de-CH" dirty="0"/>
               <a:t>Thibault Gagnaux, Philipp Lüthi und Simon Wächter</a:t>
@@ -6444,10 +6441,10 @@
       </p:sp>
       <p:pic>
         <p:nvPicPr>
-          <p:cNvPr id="3" name="Picture 2">
+          <p:cNvPr id="2" name="Picture 1">
             <a:extLst>
               <a:ext uri="{FF2B5EF4-FFF2-40B4-BE49-F238E27FC236}">
-                <a16:creationId xmlns:a16="http://schemas.microsoft.com/office/drawing/2014/main" id="{DCE039DF-FC03-46C1-A429-86C4DDACE2D5}"/>
+                <a16:creationId xmlns:a16="http://schemas.microsoft.com/office/drawing/2014/main" id="{446937F9-4A72-4233-93AC-538C5FBF71F9}"/>
               </a:ext>
             </a:extLst>
           </p:cNvPr>
@@ -6457,21 +6454,15 @@
           <p:nvPr/>
         </p:nvPicPr>
         <p:blipFill>
-          <a:blip r:embed="rId2">
-            <a:extLst>
-              <a:ext uri="{28A0092B-C50C-407E-A947-70E740481C1C}">
-                <a14:useLocalDpi xmlns:a14="http://schemas.microsoft.com/office/drawing/2010/main" val="0"/>
-              </a:ext>
-            </a:extLst>
-          </a:blip>
+          <a:blip r:embed="rId2"/>
           <a:stretch>
             <a:fillRect/>
           </a:stretch>
         </p:blipFill>
         <p:spPr>
           <a:xfrm>
-            <a:off x="2175888" y="2916535"/>
-            <a:ext cx="5616624" cy="3276910"/>
+            <a:off x="1674292" y="2988543"/>
+            <a:ext cx="6408712" cy="3563900"/>
           </a:xfrm>
           <a:prstGeom prst="rect">
             <a:avLst/>
@@ -6535,7 +6526,7 @@
                   <a:srgbClr val="000000"/>
                 </a:solidFill>
               </a:rPr>
-              <a:t>26.04.2019</a:t>
+              <a:t>28.04.2019</a:t>
             </a:fld>
             <a:endParaRPr lang="de-CH" dirty="0">
               <a:solidFill>
@@ -6664,265 +6655,6 @@
           <a:bodyPr/>
           <a:lstStyle/>
           <a:p>
-            <a:r>
-              <a:rPr lang="de-CH" dirty="0"/>
-              <a:t>«Leichtgewichtig» - 621KB (Ohne GZIP)</a:t>
-            </a:r>
-          </a:p>
-        </p:txBody>
-      </p:sp>
-      <p:pic>
-        <p:nvPicPr>
-          <p:cNvPr id="9" name="Picture 8">
-            <a:extLst>
-              <a:ext uri="{FF2B5EF4-FFF2-40B4-BE49-F238E27FC236}">
-                <a16:creationId xmlns:a16="http://schemas.microsoft.com/office/drawing/2014/main" id="{948DAE9A-0502-4DD0-9FEE-43D5A70A9B94}"/>
-              </a:ext>
-            </a:extLst>
-          </p:cNvPr>
-          <p:cNvPicPr>
-            <a:picLocks noChangeAspect="1"/>
-          </p:cNvPicPr>
-          <p:nvPr/>
-        </p:nvPicPr>
-        <p:blipFill>
-          <a:blip r:embed="rId2">
-            <a:extLst>
-              <a:ext uri="{28A0092B-C50C-407E-A947-70E740481C1C}">
-                <a14:useLocalDpi xmlns:a14="http://schemas.microsoft.com/office/drawing/2010/main" val="0"/>
-              </a:ext>
-            </a:extLst>
-          </a:blip>
-          <a:stretch>
-            <a:fillRect/>
-          </a:stretch>
-        </p:blipFill>
-        <p:spPr>
-          <a:xfrm>
-            <a:off x="666180" y="2973284"/>
-            <a:ext cx="8155280" cy="3687866"/>
-          </a:xfrm>
-          <a:prstGeom prst="rect">
-            <a:avLst/>
-          </a:prstGeom>
-        </p:spPr>
-      </p:pic>
-      <p:pic>
-        <p:nvPicPr>
-          <p:cNvPr id="10" name="Picture 9">
-            <a:extLst>
-              <a:ext uri="{FF2B5EF4-FFF2-40B4-BE49-F238E27FC236}">
-                <a16:creationId xmlns:a16="http://schemas.microsoft.com/office/drawing/2014/main" id="{FC1CBE70-8C90-4034-BD22-6482C75D657C}"/>
-              </a:ext>
-            </a:extLst>
-          </p:cNvPr>
-          <p:cNvPicPr>
-            <a:picLocks noChangeAspect="1"/>
-          </p:cNvPicPr>
-          <p:nvPr/>
-        </p:nvPicPr>
-        <p:blipFill>
-          <a:blip r:embed="rId3"/>
-          <a:stretch>
-            <a:fillRect/>
-          </a:stretch>
-        </p:blipFill>
-        <p:spPr>
-          <a:xfrm>
-            <a:off x="8005928" y="1060688"/>
-            <a:ext cx="1296655" cy="1260000"/>
-          </a:xfrm>
-          <a:prstGeom prst="rect">
-            <a:avLst/>
-          </a:prstGeom>
-        </p:spPr>
-      </p:pic>
-    </p:spTree>
-    <p:extLst>
-      <p:ext uri="{BB962C8B-B14F-4D97-AF65-F5344CB8AC3E}">
-        <p14:creationId xmlns:p14="http://schemas.microsoft.com/office/powerpoint/2010/main" val="247225592"/>
-      </p:ext>
-    </p:extLst>
-  </p:cSld>
-  <p:clrMapOvr>
-    <a:masterClrMapping/>
-  </p:clrMapOvr>
-</p:sld>
-</file>
-
-<file path=ppt/slides/slide11.xml><?xml version="1.0" encoding="utf-8"?>
-<p:sld xmlns:a="http://schemas.openxmlformats.org/drawingml/2006/main" xmlns:r="http://schemas.openxmlformats.org/officeDocument/2006/relationships" xmlns:p="http://schemas.openxmlformats.org/presentationml/2006/main">
-  <p:cSld>
-    <p:spTree>
-      <p:nvGrpSpPr>
-        <p:cNvPr id="1" name=""/>
-        <p:cNvGrpSpPr/>
-        <p:nvPr/>
-      </p:nvGrpSpPr>
-      <p:grpSpPr>
-        <a:xfrm>
-          <a:off x="0" y="0"/>
-          <a:ext cx="0" cy="0"/>
-          <a:chOff x="0" y="0"/>
-          <a:chExt cx="0" cy="0"/>
-        </a:xfrm>
-      </p:grpSpPr>
-      <p:sp>
-        <p:nvSpPr>
-          <p:cNvPr id="2" name="Date Placeholder 1">
-            <a:extLst>
-              <a:ext uri="{FF2B5EF4-FFF2-40B4-BE49-F238E27FC236}">
-                <a16:creationId xmlns:a16="http://schemas.microsoft.com/office/drawing/2014/main" id="{4CC4CD53-97C8-4515-B38B-372AC42984A5}"/>
-              </a:ext>
-            </a:extLst>
-          </p:cNvPr>
-          <p:cNvSpPr>
-            <a:spLocks noGrp="1"/>
-          </p:cNvSpPr>
-          <p:nvPr>
-            <p:ph type="dt" sz="half" idx="10"/>
-          </p:nvPr>
-        </p:nvSpPr>
-        <p:spPr/>
-        <p:txBody>
-          <a:bodyPr/>
-          <a:lstStyle/>
-          <a:p>
-            <a:fld id="{5E48492E-72D1-4785-9351-8AE1E40FBA2D}" type="datetime1">
-              <a:rPr lang="de-CH" smtClean="0">
-                <a:solidFill>
-                  <a:srgbClr val="000000"/>
-                </a:solidFill>
-              </a:rPr>
-              <a:t>26.04.2019</a:t>
-            </a:fld>
-            <a:endParaRPr lang="de-CH" dirty="0">
-              <a:solidFill>
-                <a:srgbClr val="000000"/>
-              </a:solidFill>
-            </a:endParaRPr>
-          </a:p>
-        </p:txBody>
-      </p:sp>
-      <p:sp>
-        <p:nvSpPr>
-          <p:cNvPr id="3" name="Footer Placeholder 2">
-            <a:extLst>
-              <a:ext uri="{FF2B5EF4-FFF2-40B4-BE49-F238E27FC236}">
-                <a16:creationId xmlns:a16="http://schemas.microsoft.com/office/drawing/2014/main" id="{6C6F5631-E667-4965-9044-04326E6B2422}"/>
-              </a:ext>
-            </a:extLst>
-          </p:cNvPr>
-          <p:cNvSpPr>
-            <a:spLocks noGrp="1"/>
-          </p:cNvSpPr>
-          <p:nvPr>
-            <p:ph type="ftr" sz="quarter" idx="11"/>
-          </p:nvPr>
-        </p:nvSpPr>
-        <p:spPr/>
-        <p:txBody>
-          <a:bodyPr/>
-          <a:lstStyle/>
-          <a:p>
-            <a:r>
-              <a:rPr lang="de-CH" dirty="0">
-                <a:solidFill>
-                  <a:srgbClr val="000000"/>
-                </a:solidFill>
-              </a:rPr>
-              <a:t>FHNW Workshop wodss</a:t>
-            </a:r>
-          </a:p>
-        </p:txBody>
-      </p:sp>
-      <p:sp>
-        <p:nvSpPr>
-          <p:cNvPr id="4" name="Slide Number Placeholder 3">
-            <a:extLst>
-              <a:ext uri="{FF2B5EF4-FFF2-40B4-BE49-F238E27FC236}">
-                <a16:creationId xmlns:a16="http://schemas.microsoft.com/office/drawing/2014/main" id="{BDCF1C32-AD05-41FE-880D-89AA7DA0FEB5}"/>
-              </a:ext>
-            </a:extLst>
-          </p:cNvPr>
-          <p:cNvSpPr>
-            <a:spLocks noGrp="1"/>
-          </p:cNvSpPr>
-          <p:nvPr>
-            <p:ph type="sldNum" sz="quarter" idx="12"/>
-          </p:nvPr>
-        </p:nvSpPr>
-        <p:spPr/>
-        <p:txBody>
-          <a:bodyPr/>
-          <a:lstStyle/>
-          <a:p>
-            <a:fld id="{351188DD-6605-4EF4-9E67-B567F731CE68}" type="slidenum">
-              <a:rPr lang="de-CH" smtClean="0">
-                <a:solidFill>
-                  <a:srgbClr val="000000"/>
-                </a:solidFill>
-              </a:rPr>
-              <a:pPr/>
-              <a:t>11</a:t>
-            </a:fld>
-            <a:endParaRPr lang="de-CH" dirty="0">
-              <a:solidFill>
-                <a:srgbClr val="000000"/>
-              </a:solidFill>
-            </a:endParaRPr>
-          </a:p>
-        </p:txBody>
-      </p:sp>
-      <p:sp>
-        <p:nvSpPr>
-          <p:cNvPr id="5" name="Title 4">
-            <a:extLst>
-              <a:ext uri="{FF2B5EF4-FFF2-40B4-BE49-F238E27FC236}">
-                <a16:creationId xmlns:a16="http://schemas.microsoft.com/office/drawing/2014/main" id="{6695DF22-B0FF-4DF0-9F58-6DA45C0A44E2}"/>
-              </a:ext>
-            </a:extLst>
-          </p:cNvPr>
-          <p:cNvSpPr>
-            <a:spLocks noGrp="1"/>
-          </p:cNvSpPr>
-          <p:nvPr>
-            <p:ph type="title"/>
-          </p:nvPr>
-        </p:nvSpPr>
-        <p:spPr/>
-        <p:txBody>
-          <a:bodyPr/>
-          <a:lstStyle/>
-          <a:p>
-            <a:r>
-              <a:rPr lang="de-CH" dirty="0"/>
-              <a:t>Lessons Learned 3/4: Frontend-Library Preact</a:t>
-            </a:r>
-          </a:p>
-        </p:txBody>
-      </p:sp>
-      <p:sp>
-        <p:nvSpPr>
-          <p:cNvPr id="6" name="Text Placeholder 5">
-            <a:extLst>
-              <a:ext uri="{FF2B5EF4-FFF2-40B4-BE49-F238E27FC236}">
-                <a16:creationId xmlns:a16="http://schemas.microsoft.com/office/drawing/2014/main" id="{FFE7484D-8312-4609-AD5B-1C02864D886F}"/>
-              </a:ext>
-            </a:extLst>
-          </p:cNvPr>
-          <p:cNvSpPr>
-            <a:spLocks noGrp="1"/>
-          </p:cNvSpPr>
-          <p:nvPr>
-            <p:ph type="body" idx="1"/>
-          </p:nvPr>
-        </p:nvSpPr>
-        <p:spPr/>
-        <p:txBody>
-          <a:bodyPr/>
-          <a:lstStyle/>
-          <a:p>
             <a:pPr marL="342900" indent="-342900">
               <a:buFont typeface="Arial" panose="020B0604020202020204" pitchFamily="34" charset="0"/>
               <a:buChar char="•"/>
@@ -6939,7 +6671,7 @@
             </a:pPr>
             <a:r>
               <a:rPr lang="de-CH" dirty="0"/>
-              <a:t>Es ist enorm leichtgewichtig</a:t>
+              <a:t>Enorm leichtgewichtig</a:t>
             </a:r>
           </a:p>
           <a:p>
@@ -6949,7 +6681,7 @@
             </a:pPr>
             <a:r>
               <a:rPr lang="de-CH" dirty="0"/>
-              <a:t>Kann man mit den Nachteilen umgehen: Genial</a:t>
+              <a:t>Wenn Nachteile bekannt: Genial</a:t>
             </a:r>
           </a:p>
           <a:p>
@@ -6959,7 +6691,7 @@
             </a:pPr>
             <a:r>
               <a:rPr lang="de-CH" dirty="0"/>
-              <a:t>Spielt seinen Trumpf aus, wenn man bis auf Preact alles selber schreibt</a:t>
+              <a:t>Spielt seinen Trumpf aus wenn:</a:t>
             </a:r>
           </a:p>
           <a:p>
@@ -6969,7 +6701,7 @@
             </a:pPr>
             <a:r>
               <a:rPr lang="de-CH" dirty="0"/>
-              <a:t>Kein externes CSS, sondern selber geschrieben</a:t>
+              <a:t>Es kein Ersatz für React sein soll</a:t>
             </a:r>
           </a:p>
           <a:p>
@@ -6979,7 +6711,17 @@
             </a:pPr>
             <a:r>
               <a:rPr lang="de-CH" dirty="0"/>
-              <a:t>Optionale Minimalimplementierung von Redux mit redux-zero</a:t>
+              <a:t>Wenige/keine externen React Libraries wie React/Redux</a:t>
+            </a:r>
+          </a:p>
+          <a:p>
+            <a:pPr marL="695325" lvl="1" indent="-342900">
+              <a:buFont typeface="Arial" panose="020B0604020202020204" pitchFamily="34" charset="0"/>
+              <a:buChar char="•"/>
+            </a:pPr>
+            <a:r>
+              <a:rPr lang="de-CH" dirty="0"/>
+              <a:t>Eigenes CSS</a:t>
             </a:r>
           </a:p>
           <a:p>
@@ -7041,6 +6783,277 @@
     <p:extLst>
       <p:ext uri="{BB962C8B-B14F-4D97-AF65-F5344CB8AC3E}">
         <p14:creationId xmlns:p14="http://schemas.microsoft.com/office/powerpoint/2010/main" val="692934648"/>
+      </p:ext>
+    </p:extLst>
+  </p:cSld>
+  <p:clrMapOvr>
+    <a:masterClrMapping/>
+  </p:clrMapOvr>
+</p:sld>
+</file>
+
+<file path=ppt/slides/slide11.xml><?xml version="1.0" encoding="utf-8"?>
+<p:sld xmlns:a="http://schemas.openxmlformats.org/drawingml/2006/main" xmlns:r="http://schemas.openxmlformats.org/officeDocument/2006/relationships" xmlns:p="http://schemas.openxmlformats.org/presentationml/2006/main">
+  <p:cSld>
+    <p:spTree>
+      <p:nvGrpSpPr>
+        <p:cNvPr id="1" name=""/>
+        <p:cNvGrpSpPr/>
+        <p:nvPr/>
+      </p:nvGrpSpPr>
+      <p:grpSpPr>
+        <a:xfrm>
+          <a:off x="0" y="0"/>
+          <a:ext cx="0" cy="0"/>
+          <a:chOff x="0" y="0"/>
+          <a:chExt cx="0" cy="0"/>
+        </a:xfrm>
+      </p:grpSpPr>
+      <p:sp>
+        <p:nvSpPr>
+          <p:cNvPr id="2" name="Date Placeholder 1">
+            <a:extLst>
+              <a:ext uri="{FF2B5EF4-FFF2-40B4-BE49-F238E27FC236}">
+                <a16:creationId xmlns:a16="http://schemas.microsoft.com/office/drawing/2014/main" id="{C82DA33C-D9A4-4BB2-9980-5C2394BB5FA1}"/>
+              </a:ext>
+            </a:extLst>
+          </p:cNvPr>
+          <p:cNvSpPr>
+            <a:spLocks noGrp="1"/>
+          </p:cNvSpPr>
+          <p:nvPr>
+            <p:ph type="dt" sz="half" idx="10"/>
+          </p:nvPr>
+        </p:nvSpPr>
+        <p:spPr/>
+        <p:txBody>
+          <a:bodyPr/>
+          <a:lstStyle/>
+          <a:p>
+            <a:fld id="{5E48492E-72D1-4785-9351-8AE1E40FBA2D}" type="datetime1">
+              <a:rPr lang="de-CH" smtClean="0">
+                <a:solidFill>
+                  <a:srgbClr val="000000"/>
+                </a:solidFill>
+              </a:rPr>
+              <a:t>28.04.2019</a:t>
+            </a:fld>
+            <a:endParaRPr lang="de-CH" dirty="0">
+              <a:solidFill>
+                <a:srgbClr val="000000"/>
+              </a:solidFill>
+            </a:endParaRPr>
+          </a:p>
+        </p:txBody>
+      </p:sp>
+      <p:sp>
+        <p:nvSpPr>
+          <p:cNvPr id="3" name="Footer Placeholder 2">
+            <a:extLst>
+              <a:ext uri="{FF2B5EF4-FFF2-40B4-BE49-F238E27FC236}">
+                <a16:creationId xmlns:a16="http://schemas.microsoft.com/office/drawing/2014/main" id="{B4603792-69CF-4D25-AC45-B60B79B10384}"/>
+              </a:ext>
+            </a:extLst>
+          </p:cNvPr>
+          <p:cNvSpPr>
+            <a:spLocks noGrp="1"/>
+          </p:cNvSpPr>
+          <p:nvPr>
+            <p:ph type="ftr" sz="quarter" idx="11"/>
+          </p:nvPr>
+        </p:nvSpPr>
+        <p:spPr/>
+        <p:txBody>
+          <a:bodyPr/>
+          <a:lstStyle/>
+          <a:p>
+            <a:r>
+              <a:rPr lang="de-CH" dirty="0">
+                <a:solidFill>
+                  <a:srgbClr val="000000"/>
+                </a:solidFill>
+              </a:rPr>
+              <a:t>FHNW Workshop wodss</a:t>
+            </a:r>
+          </a:p>
+        </p:txBody>
+      </p:sp>
+      <p:sp>
+        <p:nvSpPr>
+          <p:cNvPr id="4" name="Slide Number Placeholder 3">
+            <a:extLst>
+              <a:ext uri="{FF2B5EF4-FFF2-40B4-BE49-F238E27FC236}">
+                <a16:creationId xmlns:a16="http://schemas.microsoft.com/office/drawing/2014/main" id="{E6A56624-3915-4D84-8881-0F0F596F02F8}"/>
+              </a:ext>
+            </a:extLst>
+          </p:cNvPr>
+          <p:cNvSpPr>
+            <a:spLocks noGrp="1"/>
+          </p:cNvSpPr>
+          <p:nvPr>
+            <p:ph type="sldNum" sz="quarter" idx="12"/>
+          </p:nvPr>
+        </p:nvSpPr>
+        <p:spPr/>
+        <p:txBody>
+          <a:bodyPr/>
+          <a:lstStyle/>
+          <a:p>
+            <a:fld id="{351188DD-6605-4EF4-9E67-B567F731CE68}" type="slidenum">
+              <a:rPr lang="de-CH" smtClean="0">
+                <a:solidFill>
+                  <a:srgbClr val="000000"/>
+                </a:solidFill>
+              </a:rPr>
+              <a:pPr/>
+              <a:t>11</a:t>
+            </a:fld>
+            <a:endParaRPr lang="de-CH" dirty="0">
+              <a:solidFill>
+                <a:srgbClr val="000000"/>
+              </a:solidFill>
+            </a:endParaRPr>
+          </a:p>
+        </p:txBody>
+      </p:sp>
+      <p:sp>
+        <p:nvSpPr>
+          <p:cNvPr id="5" name="Title 4">
+            <a:extLst>
+              <a:ext uri="{FF2B5EF4-FFF2-40B4-BE49-F238E27FC236}">
+                <a16:creationId xmlns:a16="http://schemas.microsoft.com/office/drawing/2014/main" id="{DC9D513D-C3D4-4396-8BB1-F64E1F54CEEE}"/>
+              </a:ext>
+            </a:extLst>
+          </p:cNvPr>
+          <p:cNvSpPr>
+            <a:spLocks noGrp="1"/>
+          </p:cNvSpPr>
+          <p:nvPr>
+            <p:ph type="title"/>
+          </p:nvPr>
+        </p:nvSpPr>
+        <p:spPr/>
+        <p:txBody>
+          <a:bodyPr/>
+          <a:lstStyle/>
+          <a:p>
+            <a:r>
+              <a:rPr lang="de-CH" dirty="0"/>
+              <a:t>Lessons Learned 4/4: Teamarbeit</a:t>
+            </a:r>
+          </a:p>
+        </p:txBody>
+      </p:sp>
+      <p:sp>
+        <p:nvSpPr>
+          <p:cNvPr id="6" name="Text Placeholder 5">
+            <a:extLst>
+              <a:ext uri="{FF2B5EF4-FFF2-40B4-BE49-F238E27FC236}">
+                <a16:creationId xmlns:a16="http://schemas.microsoft.com/office/drawing/2014/main" id="{7F1C9B4A-6094-49E4-BD87-0C319BC5E5E6}"/>
+              </a:ext>
+            </a:extLst>
+          </p:cNvPr>
+          <p:cNvSpPr>
+            <a:spLocks noGrp="1"/>
+          </p:cNvSpPr>
+          <p:nvPr>
+            <p:ph type="body" idx="1"/>
+          </p:nvPr>
+        </p:nvSpPr>
+        <p:spPr/>
+        <p:txBody>
+          <a:bodyPr/>
+          <a:lstStyle/>
+          <a:p>
+            <a:pPr marL="342900" indent="-342900">
+              <a:buFont typeface="Arial" panose="020B0604020202020204" pitchFamily="34" charset="0"/>
+              <a:buChar char="•"/>
+            </a:pPr>
+            <a:r>
+              <a:rPr lang="de-CH" dirty="0"/>
+              <a:t>Wir waren zu 3 und hatten keinen «Frontendguru»</a:t>
+            </a:r>
+          </a:p>
+          <a:p>
+            <a:pPr marL="342900" indent="-342900">
+              <a:buFont typeface="Arial" panose="020B0604020202020204" pitchFamily="34" charset="0"/>
+              <a:buChar char="•"/>
+            </a:pPr>
+            <a:r>
+              <a:rPr lang="de-CH" dirty="0"/>
+              <a:t>Alternativen ausprobieren und ausloten vs. Zeit  </a:t>
+            </a:r>
+            <a:r>
+              <a:rPr lang="de-CH" dirty="0">
+                <a:sym typeface="Wingdings" panose="05000000000000000000" pitchFamily="2" charset="2"/>
+              </a:rPr>
+              <a:t> Stetiger Konflikt</a:t>
+            </a:r>
+            <a:endParaRPr lang="de-CH" dirty="0"/>
+          </a:p>
+          <a:p>
+            <a:pPr marL="342900" indent="-342900">
+              <a:buFont typeface="Arial" panose="020B0604020202020204" pitchFamily="34" charset="0"/>
+              <a:buChar char="•"/>
+            </a:pPr>
+            <a:r>
+              <a:rPr lang="de-CH" dirty="0"/>
+              <a:t>Wir waren von der Komplexität der Aufgabe beeindruckt, konnten sie aber noch abfedern</a:t>
+            </a:r>
+          </a:p>
+          <a:p>
+            <a:pPr marL="342900" indent="-342900">
+              <a:buFont typeface="Arial" panose="020B0604020202020204" pitchFamily="34" charset="0"/>
+              <a:buChar char="•"/>
+            </a:pPr>
+            <a:r>
+              <a:rPr lang="de-CH" dirty="0"/>
+              <a:t>Lesson Learned: Ein funktionierendes Backend ab Woche 3 ist sehr hilfreich</a:t>
+            </a:r>
+          </a:p>
+          <a:p>
+            <a:pPr marL="342900" indent="-342900">
+              <a:buFont typeface="Arial" panose="020B0604020202020204" pitchFamily="34" charset="0"/>
+              <a:buChar char="•"/>
+            </a:pPr>
+            <a:endParaRPr lang="de-CH" dirty="0"/>
+          </a:p>
+        </p:txBody>
+      </p:sp>
+      <p:pic>
+        <p:nvPicPr>
+          <p:cNvPr id="7" name="Picture 6">
+            <a:extLst>
+              <a:ext uri="{FF2B5EF4-FFF2-40B4-BE49-F238E27FC236}">
+                <a16:creationId xmlns:a16="http://schemas.microsoft.com/office/drawing/2014/main" id="{390741D0-2F8D-4209-A806-5B740F647816}"/>
+              </a:ext>
+            </a:extLst>
+          </p:cNvPr>
+          <p:cNvPicPr>
+            <a:picLocks noChangeAspect="1"/>
+          </p:cNvPicPr>
+          <p:nvPr/>
+        </p:nvPicPr>
+        <p:blipFill>
+          <a:blip r:embed="rId2"/>
+          <a:stretch>
+            <a:fillRect/>
+          </a:stretch>
+        </p:blipFill>
+        <p:spPr>
+          <a:xfrm>
+            <a:off x="4703054" y="5220791"/>
+            <a:ext cx="1287293" cy="1260000"/>
+          </a:xfrm>
+          <a:prstGeom prst="rect">
+            <a:avLst/>
+          </a:prstGeom>
+        </p:spPr>
+      </p:pic>
+    </p:spTree>
+    <p:extLst>
+      <p:ext uri="{BB962C8B-B14F-4D97-AF65-F5344CB8AC3E}">
+        <p14:creationId xmlns:p14="http://schemas.microsoft.com/office/powerpoint/2010/main" val="1824335520"/>
       </p:ext>
     </p:extLst>
   </p:cSld>
@@ -7094,7 +7107,7 @@
                   <a:srgbClr val="000000"/>
                 </a:solidFill>
               </a:rPr>
-              <a:t>26.04.2019</a:t>
+              <a:t>28.04.2019</a:t>
             </a:fld>
             <a:endParaRPr lang="de-CH" dirty="0">
               <a:solidFill>
@@ -7197,7 +7210,7 @@
           <a:p>
             <a:r>
               <a:rPr lang="de-CH" dirty="0"/>
-              <a:t>Lessons Learned 4/4: Teamarbeit</a:t>
+              <a:t>Fazit</a:t>
             </a:r>
           </a:p>
         </p:txBody>
@@ -7229,7 +7242,7 @@
             </a:pPr>
             <a:r>
               <a:rPr lang="de-CH" dirty="0"/>
-              <a:t>Wir waren zu 3 und hatten keinen «Frontendguru»</a:t>
+              <a:t>Unterschied «Heile Welt» versus «Realität»</a:t>
             </a:r>
           </a:p>
           <a:p>
@@ -7239,13 +7252,13 @@
             </a:pPr>
             <a:r>
               <a:rPr lang="de-CH" dirty="0"/>
-              <a:t>Alternativen ausprobieren und ausloten vs. Zeit  </a:t>
+              <a:t>Erwartungen an den Workshop unklar </a:t>
             </a:r>
             <a:r>
               <a:rPr lang="de-CH" dirty="0">
                 <a:sym typeface="Wingdings" panose="05000000000000000000" pitchFamily="2" charset="2"/>
               </a:rPr>
-              <a:t> Stetiger Konflikt, auch untereinander im Team</a:t>
+              <a:t> Aufbau muss verbessert werden</a:t>
             </a:r>
             <a:endParaRPr lang="de-CH" dirty="0"/>
           </a:p>
@@ -7256,7 +7269,13 @@
             </a:pPr>
             <a:r>
               <a:rPr lang="de-CH" dirty="0"/>
-              <a:t>Wir waren von der Komplexität der Aufgabe beeindruckt, konnten sie aber noch abfedern</a:t>
+              <a:t>Die Wahl der Technologien vor dem Ausarbeiten der Anforderungen kann gefährlich sein </a:t>
+            </a:r>
+            <a:r>
+              <a:rPr lang="de-CH" dirty="0">
+                <a:sym typeface="Wingdings" panose="05000000000000000000" pitchFamily="2" charset="2"/>
+              </a:rPr>
+              <a:t> Wir hatten noch Glück</a:t>
             </a:r>
           </a:p>
           <a:p>
@@ -7265,272 +7284,10 @@
               <a:buChar char="•"/>
             </a:pPr>
             <a:r>
-              <a:rPr lang="de-CH" dirty="0"/>
-              <a:t>Lesson Learned: Ein funktionierendes Backend ab Woche 3 ist sehr hilfreich</a:t>
-            </a:r>
-          </a:p>
-          <a:p>
-            <a:pPr marL="342900" indent="-342900">
-              <a:buFont typeface="Arial" panose="020B0604020202020204" pitchFamily="34" charset="0"/>
-              <a:buChar char="•"/>
-            </a:pPr>
-            <a:endParaRPr lang="de-CH" dirty="0"/>
-          </a:p>
-        </p:txBody>
-      </p:sp>
-      <p:pic>
-        <p:nvPicPr>
-          <p:cNvPr id="7" name="Picture 6">
-            <a:extLst>
-              <a:ext uri="{FF2B5EF4-FFF2-40B4-BE49-F238E27FC236}">
-                <a16:creationId xmlns:a16="http://schemas.microsoft.com/office/drawing/2014/main" id="{390741D0-2F8D-4209-A806-5B740F647816}"/>
-              </a:ext>
-            </a:extLst>
-          </p:cNvPr>
-          <p:cNvPicPr>
-            <a:picLocks noChangeAspect="1"/>
-          </p:cNvPicPr>
-          <p:nvPr/>
-        </p:nvPicPr>
-        <p:blipFill>
-          <a:blip r:embed="rId2"/>
-          <a:stretch>
-            <a:fillRect/>
-          </a:stretch>
-        </p:blipFill>
-        <p:spPr>
-          <a:xfrm>
-            <a:off x="4703054" y="5220791"/>
-            <a:ext cx="1287293" cy="1260000"/>
-          </a:xfrm>
-          <a:prstGeom prst="rect">
-            <a:avLst/>
-          </a:prstGeom>
-        </p:spPr>
-      </p:pic>
-    </p:spTree>
-    <p:extLst>
-      <p:ext uri="{BB962C8B-B14F-4D97-AF65-F5344CB8AC3E}">
-        <p14:creationId xmlns:p14="http://schemas.microsoft.com/office/powerpoint/2010/main" val="1824335520"/>
-      </p:ext>
-    </p:extLst>
-  </p:cSld>
-  <p:clrMapOvr>
-    <a:masterClrMapping/>
-  </p:clrMapOvr>
-</p:sld>
-</file>
-
-<file path=ppt/slides/slide13.xml><?xml version="1.0" encoding="utf-8"?>
-<p:sld xmlns:a="http://schemas.openxmlformats.org/drawingml/2006/main" xmlns:r="http://schemas.openxmlformats.org/officeDocument/2006/relationships" xmlns:p="http://schemas.openxmlformats.org/presentationml/2006/main">
-  <p:cSld>
-    <p:spTree>
-      <p:nvGrpSpPr>
-        <p:cNvPr id="1" name=""/>
-        <p:cNvGrpSpPr/>
-        <p:nvPr/>
-      </p:nvGrpSpPr>
-      <p:grpSpPr>
-        <a:xfrm>
-          <a:off x="0" y="0"/>
-          <a:ext cx="0" cy="0"/>
-          <a:chOff x="0" y="0"/>
-          <a:chExt cx="0" cy="0"/>
-        </a:xfrm>
-      </p:grpSpPr>
-      <p:sp>
-        <p:nvSpPr>
-          <p:cNvPr id="2" name="Date Placeholder 1">
-            <a:extLst>
-              <a:ext uri="{FF2B5EF4-FFF2-40B4-BE49-F238E27FC236}">
-                <a16:creationId xmlns:a16="http://schemas.microsoft.com/office/drawing/2014/main" id="{C82DA33C-D9A4-4BB2-9980-5C2394BB5FA1}"/>
-              </a:ext>
-            </a:extLst>
-          </p:cNvPr>
-          <p:cNvSpPr>
-            <a:spLocks noGrp="1"/>
-          </p:cNvSpPr>
-          <p:nvPr>
-            <p:ph type="dt" sz="half" idx="10"/>
-          </p:nvPr>
-        </p:nvSpPr>
-        <p:spPr/>
-        <p:txBody>
-          <a:bodyPr/>
-          <a:lstStyle/>
-          <a:p>
-            <a:fld id="{5E48492E-72D1-4785-9351-8AE1E40FBA2D}" type="datetime1">
-              <a:rPr lang="de-CH" smtClean="0">
-                <a:solidFill>
-                  <a:srgbClr val="000000"/>
-                </a:solidFill>
-              </a:rPr>
-              <a:t>26.04.2019</a:t>
-            </a:fld>
-            <a:endParaRPr lang="de-CH" dirty="0">
-              <a:solidFill>
-                <a:srgbClr val="000000"/>
-              </a:solidFill>
-            </a:endParaRPr>
-          </a:p>
-        </p:txBody>
-      </p:sp>
-      <p:sp>
-        <p:nvSpPr>
-          <p:cNvPr id="3" name="Footer Placeholder 2">
-            <a:extLst>
-              <a:ext uri="{FF2B5EF4-FFF2-40B4-BE49-F238E27FC236}">
-                <a16:creationId xmlns:a16="http://schemas.microsoft.com/office/drawing/2014/main" id="{B4603792-69CF-4D25-AC45-B60B79B10384}"/>
-              </a:ext>
-            </a:extLst>
-          </p:cNvPr>
-          <p:cNvSpPr>
-            <a:spLocks noGrp="1"/>
-          </p:cNvSpPr>
-          <p:nvPr>
-            <p:ph type="ftr" sz="quarter" idx="11"/>
-          </p:nvPr>
-        </p:nvSpPr>
-        <p:spPr/>
-        <p:txBody>
-          <a:bodyPr/>
-          <a:lstStyle/>
-          <a:p>
-            <a:r>
-              <a:rPr lang="de-CH" dirty="0">
-                <a:solidFill>
-                  <a:srgbClr val="000000"/>
-                </a:solidFill>
-              </a:rPr>
-              <a:t>FHNW Workshop wodss</a:t>
-            </a:r>
-          </a:p>
-        </p:txBody>
-      </p:sp>
-      <p:sp>
-        <p:nvSpPr>
-          <p:cNvPr id="4" name="Slide Number Placeholder 3">
-            <a:extLst>
-              <a:ext uri="{FF2B5EF4-FFF2-40B4-BE49-F238E27FC236}">
-                <a16:creationId xmlns:a16="http://schemas.microsoft.com/office/drawing/2014/main" id="{E6A56624-3915-4D84-8881-0F0F596F02F8}"/>
-              </a:ext>
-            </a:extLst>
-          </p:cNvPr>
-          <p:cNvSpPr>
-            <a:spLocks noGrp="1"/>
-          </p:cNvSpPr>
-          <p:nvPr>
-            <p:ph type="sldNum" sz="quarter" idx="12"/>
-          </p:nvPr>
-        </p:nvSpPr>
-        <p:spPr/>
-        <p:txBody>
-          <a:bodyPr/>
-          <a:lstStyle/>
-          <a:p>
-            <a:fld id="{351188DD-6605-4EF4-9E67-B567F731CE68}" type="slidenum">
-              <a:rPr lang="de-CH" smtClean="0">
-                <a:solidFill>
-                  <a:srgbClr val="000000"/>
-                </a:solidFill>
-              </a:rPr>
-              <a:pPr/>
-              <a:t>13</a:t>
-            </a:fld>
-            <a:endParaRPr lang="de-CH" dirty="0">
-              <a:solidFill>
-                <a:srgbClr val="000000"/>
-              </a:solidFill>
-            </a:endParaRPr>
-          </a:p>
-        </p:txBody>
-      </p:sp>
-      <p:sp>
-        <p:nvSpPr>
-          <p:cNvPr id="5" name="Title 4">
-            <a:extLst>
-              <a:ext uri="{FF2B5EF4-FFF2-40B4-BE49-F238E27FC236}">
-                <a16:creationId xmlns:a16="http://schemas.microsoft.com/office/drawing/2014/main" id="{DC9D513D-C3D4-4396-8BB1-F64E1F54CEEE}"/>
-              </a:ext>
-            </a:extLst>
-          </p:cNvPr>
-          <p:cNvSpPr>
-            <a:spLocks noGrp="1"/>
-          </p:cNvSpPr>
-          <p:nvPr>
-            <p:ph type="title"/>
-          </p:nvPr>
-        </p:nvSpPr>
-        <p:spPr/>
-        <p:txBody>
-          <a:bodyPr/>
-          <a:lstStyle/>
-          <a:p>
-            <a:r>
-              <a:rPr lang="de-CH" dirty="0"/>
-              <a:t>Fazit</a:t>
-            </a:r>
-          </a:p>
-        </p:txBody>
-      </p:sp>
-      <p:sp>
-        <p:nvSpPr>
-          <p:cNvPr id="6" name="Text Placeholder 5">
-            <a:extLst>
-              <a:ext uri="{FF2B5EF4-FFF2-40B4-BE49-F238E27FC236}">
-                <a16:creationId xmlns:a16="http://schemas.microsoft.com/office/drawing/2014/main" id="{7F1C9B4A-6094-49E4-BD87-0C319BC5E5E6}"/>
-              </a:ext>
-            </a:extLst>
-          </p:cNvPr>
-          <p:cNvSpPr>
-            <a:spLocks noGrp="1"/>
-          </p:cNvSpPr>
-          <p:nvPr>
-            <p:ph type="body" idx="1"/>
-          </p:nvPr>
-        </p:nvSpPr>
-        <p:spPr/>
-        <p:txBody>
-          <a:bodyPr/>
-          <a:lstStyle/>
-          <a:p>
-            <a:pPr marL="342900" indent="-342900">
-              <a:buFont typeface="Arial" panose="020B0604020202020204" pitchFamily="34" charset="0"/>
-              <a:buChar char="•"/>
-            </a:pPr>
-            <a:r>
-              <a:rPr lang="de-CH" dirty="0"/>
-              <a:t>Die Wahl der Technologien vor dem Ausarbeiten der Anforderungen kann gefährlich sein </a:t>
-            </a:r>
-            <a:r>
-              <a:rPr lang="de-CH" dirty="0">
-                <a:sym typeface="Wingdings" panose="05000000000000000000" pitchFamily="2" charset="2"/>
-              </a:rPr>
-              <a:t> Wir hatten noch Glück</a:t>
-            </a:r>
-          </a:p>
-          <a:p>
-            <a:pPr marL="342900" indent="-342900">
-              <a:buFont typeface="Arial" panose="020B0604020202020204" pitchFamily="34" charset="0"/>
-              <a:buChar char="•"/>
-            </a:pPr>
-            <a:r>
               <a:rPr lang="de-CH" dirty="0">
                 <a:sym typeface="Wingdings" panose="05000000000000000000" pitchFamily="2" charset="2"/>
               </a:rPr>
               <a:t>Kritisches Hinterfragen, ob die neue Library/Framework auch wirklich den erhofften Mehrwert bietet (jOOQ: Ja, Preact: Nein)</a:t>
-            </a:r>
-          </a:p>
-          <a:p>
-            <a:pPr marL="342900" indent="-342900">
-              <a:buFont typeface="Arial" panose="020B0604020202020204" pitchFamily="34" charset="0"/>
-              <a:buChar char="•"/>
-            </a:pPr>
-            <a:r>
-              <a:rPr lang="de-CH" dirty="0">
-                <a:sym typeface="Wingdings" panose="05000000000000000000" pitchFamily="2" charset="2"/>
-              </a:rPr>
-              <a:t>Früh anfangen lohnt sich</a:t>
             </a:r>
           </a:p>
           <a:p>
@@ -7562,7 +7319,7 @@
 </p:sld>
 </file>
 
-<file path=ppt/slides/slide14.xml><?xml version="1.0" encoding="utf-8"?>
+<file path=ppt/slides/slide13.xml><?xml version="1.0" encoding="utf-8"?>
 <p:sld xmlns:a="http://schemas.openxmlformats.org/drawingml/2006/main" xmlns:r="http://schemas.openxmlformats.org/officeDocument/2006/relationships" xmlns:p="http://schemas.openxmlformats.org/presentationml/2006/main">
   <p:cSld>
     <p:spTree>
@@ -7606,7 +7363,7 @@
                   <a:srgbClr val="000000"/>
                 </a:solidFill>
               </a:rPr>
-              <a:t>26.04.2019</a:t>
+              <a:t>28.04.2019</a:t>
             </a:fld>
             <a:endParaRPr lang="de-CH" dirty="0">
               <a:solidFill>
@@ -7676,7 +7433,7 @@
                 </a:solidFill>
               </a:rPr>
               <a:pPr/>
-              <a:t>14</a:t>
+              <a:t>13</a:t>
             </a:fld>
             <a:endParaRPr lang="de-CH" dirty="0">
               <a:solidFill>
@@ -7716,10 +7473,10 @@
       </p:sp>
       <p:pic>
         <p:nvPicPr>
-          <p:cNvPr id="8" name="Picture 7">
+          <p:cNvPr id="7" name="Picture 6">
             <a:extLst>
               <a:ext uri="{FF2B5EF4-FFF2-40B4-BE49-F238E27FC236}">
-                <a16:creationId xmlns:a16="http://schemas.microsoft.com/office/drawing/2014/main" id="{833D54E6-B8FA-41DC-8709-59042E4460C2}"/>
+                <a16:creationId xmlns:a16="http://schemas.microsoft.com/office/drawing/2014/main" id="{020FD9F5-BCB3-427E-9907-942AE979221C}"/>
               </a:ext>
             </a:extLst>
           </p:cNvPr>
@@ -7729,21 +7486,15 @@
           <p:nvPr/>
         </p:nvPicPr>
         <p:blipFill>
-          <a:blip r:embed="rId2">
-            <a:extLst>
-              <a:ext uri="{28A0092B-C50C-407E-A947-70E740481C1C}">
-                <a14:useLocalDpi xmlns:a14="http://schemas.microsoft.com/office/drawing/2010/main" val="0"/>
-              </a:ext>
-            </a:extLst>
-          </a:blip>
+          <a:blip r:embed="rId2"/>
           <a:stretch>
             <a:fillRect/>
           </a:stretch>
         </p:blipFill>
         <p:spPr>
           <a:xfrm>
-            <a:off x="1265748" y="1980431"/>
-            <a:ext cx="8161905" cy="4761905"/>
+            <a:off x="990216" y="2052439"/>
+            <a:ext cx="8712968" cy="4845302"/>
           </a:xfrm>
           <a:prstGeom prst="rect">
             <a:avLst/>
@@ -8046,7 +7797,7 @@
                   <a:srgbClr val="000000"/>
                 </a:solidFill>
               </a:rPr>
-              <a:t>26.04.2019</a:t>
+              <a:t>28.04.2019</a:t>
             </a:fld>
             <a:endParaRPr lang="de-CH" dirty="0">
               <a:solidFill>
@@ -8167,7 +7918,7 @@
           <p:nvPr>
             <p:extLst>
               <p:ext uri="{D42A27DB-BD31-4B8C-83A1-F6EECF244321}">
-                <p14:modId xmlns:p14="http://schemas.microsoft.com/office/powerpoint/2010/main" val="1503620593"/>
+                <p14:modId xmlns:p14="http://schemas.microsoft.com/office/powerpoint/2010/main" val="3529757153"/>
               </p:ext>
             </p:extLst>
           </p:nvPr>
@@ -8308,7 +8059,7 @@
                   <a:srgbClr val="000000"/>
                 </a:solidFill>
               </a:rPr>
-              <a:t>26.04.2019</a:t>
+              <a:t>28.04.2019</a:t>
             </a:fld>
             <a:endParaRPr lang="de-CH" dirty="0">
               <a:solidFill>
@@ -8470,8 +8221,15 @@
             </a:pPr>
             <a:r>
               <a:rPr lang="de-CH" dirty="0"/>
-              <a:t>Unterschiedliche Interpretation der Requirements</a:t>
-            </a:r>
+              <a:t>Unterschiedliche Interpretation der Requirements </a:t>
+            </a:r>
+            <a:r>
+              <a:rPr lang="de-CH" dirty="0">
+                <a:sym typeface="Wingdings" panose="05000000000000000000" pitchFamily="2" charset="2"/>
+              </a:rPr>
+              <a:t> Dozentenmeinung(en)</a:t>
+            </a:r>
+            <a:endParaRPr lang="de-CH" dirty="0"/>
           </a:p>
           <a:p>
             <a:pPr marL="695325" lvl="1" indent="-342900">
@@ -8490,6 +8248,18 @@
             </a:r>
           </a:p>
           <a:p>
+            <a:pPr marL="695325" lvl="1" indent="-342900">
+              <a:buFont typeface="Arial" panose="020B0604020202020204" pitchFamily="34" charset="0"/>
+              <a:buChar char="•"/>
+            </a:pPr>
+            <a:r>
+              <a:rPr lang="de-CH" dirty="0">
+                <a:sym typeface="Wingdings" panose="05000000000000000000" pitchFamily="2" charset="2"/>
+              </a:rPr>
+              <a:t>API first, Use Cases second  Use Cases nicht erkannt</a:t>
+            </a:r>
+          </a:p>
+          <a:p>
             <a:pPr marL="342900" indent="-342900">
               <a:buFont typeface="Arial" panose="020B0604020202020204" pitchFamily="34" charset="0"/>
               <a:buChar char="•"/>
@@ -8534,7 +8304,19 @@
               <a:rPr lang="de-CH" dirty="0">
                 <a:sym typeface="Wingdings" panose="05000000000000000000" pitchFamily="2" charset="2"/>
               </a:rPr>
-              <a:t>Im Nachhinein würden wir vieles anders spezifizieren (Subroutes auf Projekte)</a:t>
+              <a:t>Im Nachhinein würden wir vieles anders spezifizieren (Use Cases  </a:t>
+            </a:r>
+            <a:r>
+              <a:rPr lang="de-CH" dirty="0" err="1">
+                <a:sym typeface="Wingdings" panose="05000000000000000000" pitchFamily="2" charset="2"/>
+              </a:rPr>
+              <a:t>Subroutes</a:t>
+            </a:r>
+            <a:r>
+              <a:rPr lang="de-CH" dirty="0">
+                <a:sym typeface="Wingdings" panose="05000000000000000000" pitchFamily="2" charset="2"/>
+              </a:rPr>
+              <a:t> auf Projekte)</a:t>
             </a:r>
             <a:endParaRPr lang="de-CH" dirty="0"/>
           </a:p>
@@ -8597,7 +8379,7 @@
                   <a:srgbClr val="000000"/>
                 </a:solidFill>
               </a:rPr>
-              <a:t>26.04.2019</a:t>
+              <a:t>28.04.2019</a:t>
             </a:fld>
             <a:endParaRPr lang="de-CH" dirty="0">
               <a:solidFill>
@@ -8736,14 +8518,11 @@
             </a:pPr>
             <a:r>
               <a:rPr lang="de-CH" dirty="0"/>
-              <a:t>jOOQ verbindet sich zu einem SQL Server </a:t>
-            </a:r>
-            <a:r>
-              <a:rPr lang="de-CH" dirty="0">
-                <a:sym typeface="Wingdings" panose="05000000000000000000" pitchFamily="2" charset="2"/>
-              </a:rPr>
-              <a:t> Generation von Java Objekten</a:t>
-            </a:r>
+              <a:t>jOOQ: Generation von Java Objekten aus SQL</a:t>
+            </a:r>
+            <a:endParaRPr lang="de-CH" dirty="0">
+              <a:sym typeface="Wingdings" panose="05000000000000000000" pitchFamily="2" charset="2"/>
+            </a:endParaRPr>
           </a:p>
           <a:p>
             <a:pPr marL="342900" indent="-342900">
@@ -8758,11 +8537,11 @@
               <a:rPr lang="de-CH" dirty="0">
                 <a:sym typeface="Wingdings" panose="05000000000000000000" pitchFamily="2" charset="2"/>
               </a:rPr>
-              <a:t> F</a:t>
+              <a:t> A</a:t>
             </a:r>
             <a:r>
               <a:rPr lang="de-CH" dirty="0"/>
-              <a:t>ür kleine Projekte aufwändig</a:t>
+              <a:t>ufwändig</a:t>
             </a:r>
           </a:p>
           <a:p>
@@ -8772,7 +8551,7 @@
             </a:pPr>
             <a:r>
               <a:rPr lang="de-CH" dirty="0"/>
-              <a:t>Bei grossen Projekten jedoch sehr wertvoll </a:t>
+              <a:t>Enorm mächtig </a:t>
             </a:r>
             <a:r>
               <a:rPr lang="de-CH" dirty="0">
@@ -8790,7 +8569,7 @@
               <a:rPr lang="de-CH" dirty="0">
                 <a:sym typeface="Wingdings" panose="05000000000000000000" pitchFamily="2" charset="2"/>
               </a:rPr>
-              <a:t>Lessons Learned: Mächtigkeit von jOOQ in generische Klasse abstrahieren (In unserem Falle GenericCrudRepository)</a:t>
+              <a:t>Lessons Learned: Mächtigkeit von jOOQ in generische Klasse abstrahieren (Klasse GenericCrudRepository)</a:t>
             </a:r>
           </a:p>
           <a:p>
@@ -8802,8 +8581,10 @@
               <a:rPr lang="de-CH" dirty="0">
                 <a:sym typeface="Wingdings" panose="05000000000000000000" pitchFamily="2" charset="2"/>
               </a:rPr>
-              <a:t>Lessons Learned: Das Denken und in jOOQ hat das Backend stark vereinfacht</a:t>
-            </a:r>
+              <a:t>Lessons Learned: Durch Database First &amp; jOOQ konnten wir mit den API Flaws sehr gut umgehen</a:t>
+            </a:r>
+          </a:p>
+          <a:p>
             <a:endParaRPr lang="de-CH" dirty="0"/>
           </a:p>
           <a:p>
@@ -8902,7 +8683,7 @@
                   <a:srgbClr val="000000"/>
                 </a:solidFill>
               </a:rPr>
-              <a:t>26.04.2019</a:t>
+              <a:t>28.04.2019</a:t>
             </a:fld>
             <a:endParaRPr lang="de-CH" dirty="0">
               <a:solidFill>
@@ -9041,7 +8822,7 @@
             </a:pPr>
             <a:r>
               <a:rPr lang="de-CH" dirty="0"/>
-              <a:t>Generisches CRUD Repository (Wie bei Spring, einfach ohne Magie):</a:t>
+              <a:t>DSL ermöglicht Ausweichen auf komplexere &amp; typensichere Queries:</a:t>
             </a:r>
           </a:p>
           <a:p>
@@ -9055,10 +8836,10 @@
       </p:sp>
       <p:pic>
         <p:nvPicPr>
-          <p:cNvPr id="8" name="Picture 7">
+          <p:cNvPr id="9" name="Picture 8">
             <a:extLst>
               <a:ext uri="{FF2B5EF4-FFF2-40B4-BE49-F238E27FC236}">
-                <a16:creationId xmlns:a16="http://schemas.microsoft.com/office/drawing/2014/main" id="{137AB5EA-D9B0-4A95-AE2A-03DB92D8C2F7}"/>
+                <a16:creationId xmlns:a16="http://schemas.microsoft.com/office/drawing/2014/main" id="{3987FD07-38DD-465C-9B9A-E753BDE8ACBD}"/>
               </a:ext>
             </a:extLst>
           </p:cNvPr>
@@ -9075,8 +8856,8 @@
         </p:blipFill>
         <p:spPr>
           <a:xfrm>
-            <a:off x="736600" y="2844526"/>
-            <a:ext cx="7778452" cy="3959475"/>
+            <a:off x="378148" y="2916535"/>
+            <a:ext cx="10155104" cy="3672408"/>
           </a:xfrm>
           <a:prstGeom prst="rect">
             <a:avLst/>
@@ -9086,7 +8867,7 @@
     </p:spTree>
     <p:extLst>
       <p:ext uri="{BB962C8B-B14F-4D97-AF65-F5344CB8AC3E}">
-        <p14:creationId xmlns:p14="http://schemas.microsoft.com/office/powerpoint/2010/main" val="672311113"/>
+        <p14:creationId xmlns:p14="http://schemas.microsoft.com/office/powerpoint/2010/main" val="4226956745"/>
       </p:ext>
     </p:extLst>
   </p:cSld>
@@ -9118,7 +8899,7 @@
           <p:cNvPr id="2" name="Date Placeholder 1">
             <a:extLst>
               <a:ext uri="{FF2B5EF4-FFF2-40B4-BE49-F238E27FC236}">
-                <a16:creationId xmlns:a16="http://schemas.microsoft.com/office/drawing/2014/main" id="{ED5183F7-724A-4F53-998E-A0C4D9B15D3F}"/>
+                <a16:creationId xmlns:a16="http://schemas.microsoft.com/office/drawing/2014/main" id="{4CC4CD53-97C8-4515-B38B-372AC42984A5}"/>
               </a:ext>
             </a:extLst>
           </p:cNvPr>
@@ -9140,7 +8921,7 @@
                   <a:srgbClr val="000000"/>
                 </a:solidFill>
               </a:rPr>
-              <a:t>26.04.2019</a:t>
+              <a:t>28.04.2019</a:t>
             </a:fld>
             <a:endParaRPr lang="de-CH" dirty="0">
               <a:solidFill>
@@ -9155,7 +8936,7 @@
           <p:cNvPr id="3" name="Footer Placeholder 2">
             <a:extLst>
               <a:ext uri="{FF2B5EF4-FFF2-40B4-BE49-F238E27FC236}">
-                <a16:creationId xmlns:a16="http://schemas.microsoft.com/office/drawing/2014/main" id="{F4FD4A02-9459-4EC3-A171-2F74703B59AA}"/>
+                <a16:creationId xmlns:a16="http://schemas.microsoft.com/office/drawing/2014/main" id="{6C6F5631-E667-4965-9044-04326E6B2422}"/>
               </a:ext>
             </a:extLst>
           </p:cNvPr>
@@ -9187,7 +8968,7 @@
           <p:cNvPr id="4" name="Slide Number Placeholder 3">
             <a:extLst>
               <a:ext uri="{FF2B5EF4-FFF2-40B4-BE49-F238E27FC236}">
-                <a16:creationId xmlns:a16="http://schemas.microsoft.com/office/drawing/2014/main" id="{BD189039-1C06-4621-ACEA-7001E1EB6B63}"/>
+                <a16:creationId xmlns:a16="http://schemas.microsoft.com/office/drawing/2014/main" id="{BDCF1C32-AD05-41FE-880D-89AA7DA0FEB5}"/>
               </a:ext>
             </a:extLst>
           </p:cNvPr>
@@ -9225,7 +9006,7 @@
           <p:cNvPr id="5" name="Title 4">
             <a:extLst>
               <a:ext uri="{FF2B5EF4-FFF2-40B4-BE49-F238E27FC236}">
-                <a16:creationId xmlns:a16="http://schemas.microsoft.com/office/drawing/2014/main" id="{5612582D-7F95-4608-A8F7-20B6DD1258DD}"/>
+                <a16:creationId xmlns:a16="http://schemas.microsoft.com/office/drawing/2014/main" id="{6695DF22-B0FF-4DF0-9F58-6DA45C0A44E2}"/>
               </a:ext>
             </a:extLst>
           </p:cNvPr>
@@ -9243,12 +9024,8 @@
           <a:p>
             <a:r>
               <a:rPr lang="de-CH" dirty="0"/>
-              <a:t>Lessons Learned 2/4: Datenbankwrapper jOOQ</a:t>
-            </a:r>
-            <a:br>
-              <a:rPr lang="de-CH" dirty="0"/>
-            </a:br>
-            <a:endParaRPr lang="de-CH" dirty="0"/>
+              <a:t>Lessons Learned 3/4: Frontend-Library Preact</a:t>
+            </a:r>
           </a:p>
         </p:txBody>
       </p:sp>
@@ -9257,7 +9034,7 @@
           <p:cNvPr id="6" name="Text Placeholder 5">
             <a:extLst>
               <a:ext uri="{FF2B5EF4-FFF2-40B4-BE49-F238E27FC236}">
-                <a16:creationId xmlns:a16="http://schemas.microsoft.com/office/drawing/2014/main" id="{1ACA2F2D-AB71-40AB-BDCC-C72311306FF8}"/>
+                <a16:creationId xmlns:a16="http://schemas.microsoft.com/office/drawing/2014/main" id="{FFE7484D-8312-4609-AD5B-1C02864D886F}"/>
               </a:ext>
             </a:extLst>
           </p:cNvPr>
@@ -9279,7 +9056,57 @@
             </a:pPr>
             <a:r>
               <a:rPr lang="de-CH" dirty="0"/>
-              <a:t>DSL ermöglicht Ausweichen auf komplexere &amp; typensichere Queries:</a:t>
+              <a:t>Motivation durch Dozierende: Neue Frontendtechnologie</a:t>
+            </a:r>
+          </a:p>
+          <a:p>
+            <a:pPr marL="342900" indent="-342900">
+              <a:buFont typeface="Arial" panose="020B0604020202020204" pitchFamily="34" charset="0"/>
+              <a:buChar char="•"/>
+            </a:pPr>
+            <a:r>
+              <a:rPr lang="de-CH" dirty="0"/>
+              <a:t>Idee: Wechsel zu «Preact» (3KB statt 45KB)</a:t>
+            </a:r>
+          </a:p>
+          <a:p>
+            <a:pPr marL="695325" lvl="1" indent="-342900">
+              <a:buFont typeface="Arial" panose="020B0604020202020204" pitchFamily="34" charset="0"/>
+              <a:buChar char="•"/>
+            </a:pPr>
+            <a:r>
+              <a:rPr lang="de-CH" dirty="0"/>
+              <a:t>Enorm leichtgewichtig</a:t>
+            </a:r>
+          </a:p>
+          <a:p>
+            <a:pPr marL="695325" lvl="1" indent="-342900">
+              <a:buFont typeface="Arial" panose="020B0604020202020204" pitchFamily="34" charset="0"/>
+              <a:buChar char="•"/>
+            </a:pPr>
+            <a:r>
+              <a:rPr lang="de-CH" dirty="0"/>
+              <a:t>Drop In Replacement zu React</a:t>
+            </a:r>
+          </a:p>
+          <a:p>
+            <a:pPr marL="695325" lvl="1" indent="-342900">
+              <a:buFont typeface="Arial" panose="020B0604020202020204" pitchFamily="34" charset="0"/>
+              <a:buChar char="•"/>
+            </a:pPr>
+            <a:r>
+              <a:rPr lang="de-CH" dirty="0"/>
+              <a:t>Kompatibilitätslayer für Edge Cases</a:t>
+            </a:r>
+          </a:p>
+          <a:p>
+            <a:pPr marL="342900" indent="-342900">
+              <a:buFont typeface="Arial" panose="020B0604020202020204" pitchFamily="34" charset="0"/>
+              <a:buChar char="•"/>
+            </a:pPr>
+            <a:r>
+              <a:rPr lang="de-CH" dirty="0"/>
+              <a:t>React Libraries «sollten» funktionieren</a:t>
             </a:r>
           </a:p>
           <a:p>
@@ -9296,7 +9123,7 @@
           <p:cNvPr id="7" name="Picture 6">
             <a:extLst>
               <a:ext uri="{FF2B5EF4-FFF2-40B4-BE49-F238E27FC236}">
-                <a16:creationId xmlns:a16="http://schemas.microsoft.com/office/drawing/2014/main" id="{D2E83190-817B-43E8-BEFA-34FF1C620F4B}"/>
+                <a16:creationId xmlns:a16="http://schemas.microsoft.com/office/drawing/2014/main" id="{A476C142-3994-4F0C-B8C3-C1F5318E50D2}"/>
               </a:ext>
             </a:extLst>
           </p:cNvPr>
@@ -9313,8 +9140,8 @@
         </p:blipFill>
         <p:spPr>
           <a:xfrm>
-            <a:off x="774311" y="2700511"/>
-            <a:ext cx="9144778" cy="3744416"/>
+            <a:off x="4703054" y="5220791"/>
+            <a:ext cx="1287293" cy="1260000"/>
           </a:xfrm>
           <a:prstGeom prst="rect">
             <a:avLst/>
@@ -9324,7 +9151,7 @@
     </p:spTree>
     <p:extLst>
       <p:ext uri="{BB962C8B-B14F-4D97-AF65-F5344CB8AC3E}">
-        <p14:creationId xmlns:p14="http://schemas.microsoft.com/office/powerpoint/2010/main" val="4226956745"/>
+        <p14:creationId xmlns:p14="http://schemas.microsoft.com/office/powerpoint/2010/main" val="4024876126"/>
       </p:ext>
     </p:extLst>
   </p:cSld>
@@ -9378,7 +9205,7 @@
                   <a:srgbClr val="000000"/>
                 </a:solidFill>
               </a:rPr>
-              <a:t>26.04.2019</a:t>
+              <a:t>28.04.2019</a:t>
             </a:fld>
             <a:endParaRPr lang="de-CH" dirty="0">
               <a:solidFill>
@@ -9513,17 +9340,7 @@
             </a:pPr>
             <a:r>
               <a:rPr lang="de-CH" dirty="0"/>
-              <a:t>React ist nicht leichtgewichtig und litt unter Lizenproblemen (Inzwischen entschärft): </a:t>
-            </a:r>
-            <a:r>
-              <a:rPr lang="de-CH" sz="1800" dirty="0">
-                <a:hlinkClick r:id="rId2"/>
-              </a:rPr>
-              <a:t>https://www.theregister.co.uk/2017/09/26/facebook_license_surgery_on_react/</a:t>
-            </a:r>
-            <a:r>
-              <a:rPr lang="de-CH" dirty="0"/>
-              <a:t>)</a:t>
+              <a:t>Preact CLI Tooling kann nicht überzeugen</a:t>
             </a:r>
           </a:p>
           <a:p>
@@ -9533,7 +9350,43 @@
             </a:pPr>
             <a:r>
               <a:rPr lang="de-CH" dirty="0"/>
-              <a:t>Idee: Wechsel zu «Preact» (3KB statt 45KB)</a:t>
+              <a:t>Verwendung der Kompatibilitätslayer nicht möglich</a:t>
+            </a:r>
+          </a:p>
+          <a:p>
+            <a:pPr marL="695325" lvl="1" indent="-342900">
+              <a:buFont typeface="Arial" panose="020B0604020202020204" pitchFamily="34" charset="0"/>
+              <a:buChar char="•"/>
+            </a:pPr>
+            <a:r>
+              <a:rPr lang="de-CH" dirty="0"/>
+              <a:t>Faktisch keine React Third-Party Libraries verwendbar</a:t>
+            </a:r>
+          </a:p>
+          <a:p>
+            <a:pPr marL="695325" lvl="1" indent="-342900">
+              <a:buFont typeface="Arial" panose="020B0604020202020204" pitchFamily="34" charset="0"/>
+              <a:buChar char="•"/>
+            </a:pPr>
+            <a:r>
+              <a:rPr lang="de-CH" dirty="0"/>
+              <a:t>Kein reactstrap </a:t>
+            </a:r>
+            <a:r>
+              <a:rPr lang="de-CH" dirty="0">
+                <a:sym typeface="Wingdings" panose="05000000000000000000" pitchFamily="2" charset="2"/>
+              </a:rPr>
+              <a:t> keine Modalen Dialoge</a:t>
+            </a:r>
+          </a:p>
+          <a:p>
+            <a:pPr marL="695325" lvl="1" indent="-342900">
+              <a:buFont typeface="Arial" panose="020B0604020202020204" pitchFamily="34" charset="0"/>
+              <a:buChar char="•"/>
+            </a:pPr>
+            <a:r>
+              <a:rPr lang="de-CH" dirty="0"/>
+              <a:t>Fallback: Vanilla Bootstrap mit den ganzen Abhängigkeiten wie jQuery und Popper.js (#Autsch) </a:t>
             </a:r>
           </a:p>
           <a:p>
@@ -9542,22 +9395,23 @@
               <a:buChar char="•"/>
             </a:pPr>
             <a:r>
-              <a:rPr lang="de-CH" dirty="0"/>
-              <a:t>«Drop In Replacement» mit zusätzlichem React «Compatibility Layer» Projekt «preact-compat» (+2KB) </a:t>
-            </a:r>
-            <a:r>
               <a:rPr lang="de-CH" dirty="0">
                 <a:sym typeface="Wingdings" panose="05000000000000000000" pitchFamily="2" charset="2"/>
               </a:rPr>
-              <a:t> Alles React sollte laufen</a:t>
-            </a:r>
-            <a:endParaRPr lang="de-CH" dirty="0"/>
+              <a:t>Im Endeffekt: Reinvent the Wheel  Projektkritisch</a:t>
+            </a:r>
           </a:p>
           <a:p>
             <a:pPr marL="342900" indent="-342900">
               <a:buFont typeface="Arial" panose="020B0604020202020204" pitchFamily="34" charset="0"/>
               <a:buChar char="•"/>
             </a:pPr>
+            <a:r>
+              <a:rPr lang="de-CH" dirty="0">
+                <a:sym typeface="Wingdings" panose="05000000000000000000" pitchFamily="2" charset="2"/>
+              </a:rPr>
+              <a:t>Der Vorteil der Leichtgewichtigkeit wird zerstört</a:t>
+            </a:r>
             <a:endParaRPr lang="de-CH" dirty="0"/>
           </a:p>
           <a:p>
@@ -9574,7 +9428,7 @@
           <p:cNvPr id="7" name="Picture 6">
             <a:extLst>
               <a:ext uri="{FF2B5EF4-FFF2-40B4-BE49-F238E27FC236}">
-                <a16:creationId xmlns:a16="http://schemas.microsoft.com/office/drawing/2014/main" id="{A476C142-3994-4F0C-B8C3-C1F5318E50D2}"/>
+                <a16:creationId xmlns:a16="http://schemas.microsoft.com/office/drawing/2014/main" id="{6D35E9E7-9111-44B2-98E5-372F339AC379}"/>
               </a:ext>
             </a:extLst>
           </p:cNvPr>
@@ -9584,15 +9438,15 @@
           <p:nvPr/>
         </p:nvPicPr>
         <p:blipFill>
-          <a:blip r:embed="rId3"/>
+          <a:blip r:embed="rId2"/>
           <a:stretch>
             <a:fillRect/>
           </a:stretch>
         </p:blipFill>
         <p:spPr>
           <a:xfrm>
-            <a:off x="4703054" y="5220791"/>
-            <a:ext cx="1287293" cy="1260000"/>
+            <a:off x="8005928" y="4932759"/>
+            <a:ext cx="1296655" cy="1260000"/>
           </a:xfrm>
           <a:prstGeom prst="rect">
             <a:avLst/>
@@ -9602,7 +9456,7 @@
     </p:spTree>
     <p:extLst>
       <p:ext uri="{BB962C8B-B14F-4D97-AF65-F5344CB8AC3E}">
-        <p14:creationId xmlns:p14="http://schemas.microsoft.com/office/powerpoint/2010/main" val="4024876126"/>
+        <p14:creationId xmlns:p14="http://schemas.microsoft.com/office/powerpoint/2010/main" val="2327466414"/>
       </p:ext>
     </p:extLst>
   </p:cSld>
@@ -9656,7 +9510,7 @@
                   <a:srgbClr val="000000"/>
                 </a:solidFill>
               </a:rPr>
-              <a:t>26.04.2019</a:t>
+              <a:t>28.04.2019</a:t>
             </a:fld>
             <a:endParaRPr lang="de-CH" dirty="0">
               <a:solidFill>
@@ -9791,63 +9645,7 @@
             </a:pPr>
             <a:r>
               <a:rPr lang="de-CH" dirty="0"/>
-              <a:t>In der Idee toll, in der Umsetzung eine Gefährdung des Projektes</a:t>
-            </a:r>
-          </a:p>
-          <a:p>
-            <a:pPr marL="695325" lvl="1" indent="-342900">
-              <a:buFont typeface="Arial" panose="020B0604020202020204" pitchFamily="34" charset="0"/>
-              <a:buChar char="•"/>
-            </a:pPr>
-            <a:r>
-              <a:rPr lang="de-CH" dirty="0"/>
-              <a:t>Ohne «preact-compat» </a:t>
-            </a:r>
-            <a:r>
-              <a:rPr lang="de-CH" dirty="0">
-                <a:sym typeface="Wingdings" panose="05000000000000000000" pitchFamily="2" charset="2"/>
-              </a:rPr>
-              <a:t> K</a:t>
-            </a:r>
-            <a:r>
-              <a:rPr lang="de-CH" dirty="0"/>
-              <a:t>eine React Libraries (Da kein react-dom)</a:t>
-            </a:r>
-          </a:p>
-          <a:p>
-            <a:pPr marL="695325" lvl="1" indent="-342900">
-              <a:buFont typeface="Arial" panose="020B0604020202020204" pitchFamily="34" charset="0"/>
-              <a:buChar char="•"/>
-            </a:pPr>
-            <a:r>
-              <a:rPr lang="de-CH" dirty="0"/>
-              <a:t>Faktisch keine React Third-Party Libraries verwendbar</a:t>
-            </a:r>
-          </a:p>
-          <a:p>
-            <a:pPr marL="695325" lvl="1" indent="-342900">
-              <a:buFont typeface="Arial" panose="020B0604020202020204" pitchFamily="34" charset="0"/>
-              <a:buChar char="•"/>
-            </a:pPr>
-            <a:r>
-              <a:rPr lang="de-CH" dirty="0"/>
-              <a:t>Kein reactstrap </a:t>
-            </a:r>
-            <a:r>
-              <a:rPr lang="de-CH" dirty="0">
-                <a:sym typeface="Wingdings" panose="05000000000000000000" pitchFamily="2" charset="2"/>
-              </a:rPr>
-              <a:t> keine Modalen Dialoge</a:t>
-            </a:r>
-          </a:p>
-          <a:p>
-            <a:pPr marL="695325" lvl="1" indent="-342900">
-              <a:buFont typeface="Arial" panose="020B0604020202020204" pitchFamily="34" charset="0"/>
-              <a:buChar char="•"/>
-            </a:pPr>
-            <a:r>
-              <a:rPr lang="de-CH" dirty="0"/>
-              <a:t>Fallback: Vanilla Bootstrap mit jQuery (#Autsch) </a:t>
+              <a:t>Unsere App wurde grösser als mit React (Kein GZIP)</a:t>
             </a:r>
           </a:p>
           <a:p>
@@ -9856,40 +9654,18 @@
               <a:buChar char="•"/>
             </a:pPr>
             <a:r>
-              <a:rPr lang="de-CH" dirty="0">
-                <a:sym typeface="Wingdings" panose="05000000000000000000" pitchFamily="2" charset="2"/>
-              </a:rPr>
-              <a:t>Im Endeffekt: Reinvent the Wheel</a:t>
-            </a:r>
-          </a:p>
-          <a:p>
-            <a:pPr marL="342900" indent="-342900">
-              <a:buFont typeface="Arial" panose="020B0604020202020204" pitchFamily="34" charset="0"/>
-              <a:buChar char="•"/>
-            </a:pPr>
-            <a:r>
-              <a:rPr lang="de-CH" dirty="0">
-                <a:sym typeface="Wingdings" panose="05000000000000000000" pitchFamily="2" charset="2"/>
-              </a:rPr>
-              <a:t>Der Vorteil der Leichtgewichtigkeit wird zerstört</a:t>
-            </a:r>
-            <a:endParaRPr lang="de-CH" dirty="0"/>
-          </a:p>
-          <a:p>
-            <a:pPr marL="342900" indent="-342900">
-              <a:buFont typeface="Arial" panose="020B0604020202020204" pitchFamily="34" charset="0"/>
-              <a:buChar char="•"/>
-            </a:pPr>
-            <a:endParaRPr lang="de-CH" dirty="0"/>
+              <a:rPr lang="de-CH" dirty="0"/>
+              <a:t>Trost: Progressive Web App (PWA) Support, nicht deaktivierbar</a:t>
+            </a:r>
           </a:p>
         </p:txBody>
       </p:sp>
       <p:pic>
         <p:nvPicPr>
-          <p:cNvPr id="7" name="Picture 6">
+          <p:cNvPr id="10" name="Picture 9">
             <a:extLst>
               <a:ext uri="{FF2B5EF4-FFF2-40B4-BE49-F238E27FC236}">
-                <a16:creationId xmlns:a16="http://schemas.microsoft.com/office/drawing/2014/main" id="{6D35E9E7-9111-44B2-98E5-372F339AC379}"/>
+                <a16:creationId xmlns:a16="http://schemas.microsoft.com/office/drawing/2014/main" id="{FC1CBE70-8C90-4034-BD22-6482C75D657C}"/>
               </a:ext>
             </a:extLst>
           </p:cNvPr>
@@ -9906,8 +9682,38 @@
         </p:blipFill>
         <p:spPr>
           <a:xfrm>
-            <a:off x="8005928" y="4932759"/>
+            <a:off x="8005928" y="1060688"/>
             <a:ext cx="1296655" cy="1260000"/>
+          </a:xfrm>
+          <a:prstGeom prst="rect">
+            <a:avLst/>
+          </a:prstGeom>
+        </p:spPr>
+      </p:pic>
+      <p:pic>
+        <p:nvPicPr>
+          <p:cNvPr id="7" name="Picture 6">
+            <a:extLst>
+              <a:ext uri="{FF2B5EF4-FFF2-40B4-BE49-F238E27FC236}">
+                <a16:creationId xmlns:a16="http://schemas.microsoft.com/office/drawing/2014/main" id="{5B79E5EF-5CF1-461B-A3FD-85E1CD35FC17}"/>
+              </a:ext>
+            </a:extLst>
+          </p:cNvPr>
+          <p:cNvPicPr>
+            <a:picLocks noChangeAspect="1"/>
+          </p:cNvPicPr>
+          <p:nvPr/>
+        </p:nvPicPr>
+        <p:blipFill>
+          <a:blip r:embed="rId3"/>
+          <a:stretch>
+            <a:fillRect/>
+          </a:stretch>
+        </p:blipFill>
+        <p:spPr>
+          <a:xfrm>
+            <a:off x="736600" y="3274694"/>
+            <a:ext cx="9487059" cy="1260000"/>
           </a:xfrm>
           <a:prstGeom prst="rect">
             <a:avLst/>
@@ -9917,7 +9723,7 @@
     </p:spTree>
     <p:extLst>
       <p:ext uri="{BB962C8B-B14F-4D97-AF65-F5344CB8AC3E}">
-        <p14:creationId xmlns:p14="http://schemas.microsoft.com/office/powerpoint/2010/main" val="2327466414"/>
+        <p14:creationId xmlns:p14="http://schemas.microsoft.com/office/powerpoint/2010/main" val="247225592"/>
       </p:ext>
     </p:extLst>
   </p:cSld>
@@ -10177,7 +9983,7 @@
         <a:effectLst/>
         <a:extLst>
           <a:ext uri="{AF507438-7753-43e0-B8FC-AC1667EBCBE1}">
-            <a14:hiddenEffects xmlns:a14="http://schemas.microsoft.com/office/drawing/2010/main" xmlns="">
+            <a14:hiddenEffects xmlns="" xmlns:a14="http://schemas.microsoft.com/office/drawing/2010/main">
               <a:effectLst>
                 <a:outerShdw dist="35921" dir="2700000" algn="ctr" rotWithShape="0">
                   <a:schemeClr val="bg2"/>
@@ -10250,7 +10056,7 @@
         <a:effectLst/>
         <a:extLst>
           <a:ext uri="{AF507438-7753-43e0-B8FC-AC1667EBCBE1}">
-            <a14:hiddenEffects xmlns:a14="http://schemas.microsoft.com/office/drawing/2010/main" xmlns="">
+            <a14:hiddenEffects xmlns="" xmlns:a14="http://schemas.microsoft.com/office/drawing/2010/main">
               <a:effectLst>
                 <a:outerShdw dist="35921" dir="2700000" algn="ctr" rotWithShape="0">
                   <a:schemeClr val="bg2"/>

</xml_diff>